<commit_message>
Added branching and remote repos to the powerpoint
</commit_message>
<xml_diff>
--- a/dfo_git_workshop/Using version control.pptx
+++ b/dfo_git_workshop/Using version control.pptx
@@ -5,7 +5,7 @@
     <p:sldMasterId id="2147483684" r:id="rId1"/>
   </p:sldMasterIdLst>
   <p:notesMasterIdLst>
-    <p:notesMasterId r:id="rId37"/>
+    <p:notesMasterId r:id="rId38"/>
   </p:notesMasterIdLst>
   <p:sldIdLst>
     <p:sldId id="256" r:id="rId2"/>
@@ -38,11 +38,12 @@
     <p:sldId id="297" r:id="rId29"/>
     <p:sldId id="294" r:id="rId30"/>
     <p:sldId id="288" r:id="rId31"/>
-    <p:sldId id="289" r:id="rId32"/>
-    <p:sldId id="290" r:id="rId33"/>
-    <p:sldId id="298" r:id="rId34"/>
-    <p:sldId id="268" r:id="rId35"/>
-    <p:sldId id="282" r:id="rId36"/>
+    <p:sldId id="299" r:id="rId32"/>
+    <p:sldId id="289" r:id="rId33"/>
+    <p:sldId id="290" r:id="rId34"/>
+    <p:sldId id="298" r:id="rId35"/>
+    <p:sldId id="268" r:id="rId36"/>
+    <p:sldId id="282" r:id="rId37"/>
   </p:sldIdLst>
   <p:sldSz cx="12192000" cy="6858000"/>
   <p:notesSz cx="6858000" cy="9144000"/>
@@ -231,7 +232,7 @@
           <a:p>
             <a:fld id="{419EAFB0-D06D-49D8-BD59-4B489921E9EB}" type="datetimeFigureOut">
               <a:rPr lang="en-CA" smtClean="0"/>
-              <a:t>2017-11-29</a:t>
+              <a:t>2017-12-01</a:t>
             </a:fld>
             <a:endParaRPr lang="en-CA"/>
           </a:p>
@@ -869,7 +870,7 @@
           <a:p>
             <a:fld id="{0EC1CE10-7A36-4A3B-849C-60992C6CD584}" type="datetimeFigureOut">
               <a:rPr lang="en-CA" smtClean="0"/>
-              <a:t>2017-11-29</a:t>
+              <a:t>2017-12-01</a:t>
             </a:fld>
             <a:endParaRPr lang="en-CA"/>
           </a:p>
@@ -1039,7 +1040,7 @@
           <a:p>
             <a:fld id="{0EC1CE10-7A36-4A3B-849C-60992C6CD584}" type="datetimeFigureOut">
               <a:rPr lang="en-CA" smtClean="0"/>
-              <a:t>2017-11-29</a:t>
+              <a:t>2017-12-01</a:t>
             </a:fld>
             <a:endParaRPr lang="en-CA"/>
           </a:p>
@@ -1219,7 +1220,7 @@
           <a:p>
             <a:fld id="{0EC1CE10-7A36-4A3B-849C-60992C6CD584}" type="datetimeFigureOut">
               <a:rPr lang="en-CA" smtClean="0"/>
-              <a:t>2017-11-29</a:t>
+              <a:t>2017-12-01</a:t>
             </a:fld>
             <a:endParaRPr lang="en-CA"/>
           </a:p>
@@ -1389,7 +1390,7 @@
           <a:p>
             <a:fld id="{0EC1CE10-7A36-4A3B-849C-60992C6CD584}" type="datetimeFigureOut">
               <a:rPr lang="en-CA" smtClean="0"/>
-              <a:t>2017-11-29</a:t>
+              <a:t>2017-12-01</a:t>
             </a:fld>
             <a:endParaRPr lang="en-CA"/>
           </a:p>
@@ -1635,7 +1636,7 @@
           <a:p>
             <a:fld id="{0EC1CE10-7A36-4A3B-849C-60992C6CD584}" type="datetimeFigureOut">
               <a:rPr lang="en-CA" smtClean="0"/>
-              <a:t>2017-11-29</a:t>
+              <a:t>2017-12-01</a:t>
             </a:fld>
             <a:endParaRPr lang="en-CA"/>
           </a:p>
@@ -1867,7 +1868,7 @@
           <a:p>
             <a:fld id="{0EC1CE10-7A36-4A3B-849C-60992C6CD584}" type="datetimeFigureOut">
               <a:rPr lang="en-CA" smtClean="0"/>
-              <a:t>2017-11-29</a:t>
+              <a:t>2017-12-01</a:t>
             </a:fld>
             <a:endParaRPr lang="en-CA"/>
           </a:p>
@@ -2234,7 +2235,7 @@
           <a:p>
             <a:fld id="{0EC1CE10-7A36-4A3B-849C-60992C6CD584}" type="datetimeFigureOut">
               <a:rPr lang="en-CA" smtClean="0"/>
-              <a:t>2017-11-29</a:t>
+              <a:t>2017-12-01</a:t>
             </a:fld>
             <a:endParaRPr lang="en-CA"/>
           </a:p>
@@ -2352,7 +2353,7 @@
           <a:p>
             <a:fld id="{0EC1CE10-7A36-4A3B-849C-60992C6CD584}" type="datetimeFigureOut">
               <a:rPr lang="en-CA" smtClean="0"/>
-              <a:t>2017-11-29</a:t>
+              <a:t>2017-12-01</a:t>
             </a:fld>
             <a:endParaRPr lang="en-CA"/>
           </a:p>
@@ -2447,7 +2448,7 @@
           <a:p>
             <a:fld id="{0EC1CE10-7A36-4A3B-849C-60992C6CD584}" type="datetimeFigureOut">
               <a:rPr lang="en-CA" smtClean="0"/>
-              <a:t>2017-11-29</a:t>
+              <a:t>2017-12-01</a:t>
             </a:fld>
             <a:endParaRPr lang="en-CA"/>
           </a:p>
@@ -2724,7 +2725,7 @@
           <a:p>
             <a:fld id="{0EC1CE10-7A36-4A3B-849C-60992C6CD584}" type="datetimeFigureOut">
               <a:rPr lang="en-CA" smtClean="0"/>
-              <a:t>2017-11-29</a:t>
+              <a:t>2017-12-01</a:t>
             </a:fld>
             <a:endParaRPr lang="en-CA"/>
           </a:p>
@@ -2981,7 +2982,7 @@
           <a:p>
             <a:fld id="{0EC1CE10-7A36-4A3B-849C-60992C6CD584}" type="datetimeFigureOut">
               <a:rPr lang="en-CA" smtClean="0"/>
-              <a:t>2017-11-29</a:t>
+              <a:t>2017-12-01</a:t>
             </a:fld>
             <a:endParaRPr lang="en-CA"/>
           </a:p>
@@ -3194,7 +3195,7 @@
           <a:p>
             <a:fld id="{0EC1CE10-7A36-4A3B-849C-60992C6CD584}" type="datetimeFigureOut">
               <a:rPr lang="en-CA" smtClean="0"/>
-              <a:t>2017-11-29</a:t>
+              <a:t>2017-12-01</a:t>
             </a:fld>
             <a:endParaRPr lang="en-CA"/>
           </a:p>
@@ -3746,26 +3747,14 @@
           <a:p>
             <a:r>
               <a:rPr lang="en-CA" sz="3600" dirty="0" smtClean="0"/>
-              <a:t>Slightly more advanced (if I have time</a:t>
-            </a:r>
+              <a:t>Slightly more advanced (if I have time):</a:t>
+            </a:r>
+          </a:p>
+          <a:p>
+            <a:pPr lvl="1"/>
             <a:r>
               <a:rPr lang="en-CA" sz="3600" dirty="0" smtClean="0"/>
-              <a:t>):</a:t>
-            </a:r>
-          </a:p>
-          <a:p>
-            <a:pPr lvl="1"/>
-            <a:r>
-              <a:rPr lang="en-CA" sz="3600" dirty="0" smtClean="0"/>
-              <a:t>Going </a:t>
-            </a:r>
-            <a:r>
-              <a:rPr lang="en-CA" sz="3600" dirty="0" smtClean="0"/>
-              <a:t>back in time with </a:t>
-            </a:r>
-            <a:r>
-              <a:rPr lang="en-CA" sz="3600" dirty="0" smtClean="0"/>
-              <a:t>branches</a:t>
+              <a:t>Going back in time with branches</a:t>
             </a:r>
           </a:p>
           <a:p>
@@ -3774,7 +3763,6 @@
               <a:rPr lang="en-CA" sz="3600" dirty="0" smtClean="0"/>
               <a:t>Collaborating using local and remote repositories</a:t>
             </a:r>
-            <a:endParaRPr lang="en-CA" sz="3600" dirty="0" smtClean="0"/>
           </a:p>
           <a:p>
             <a:pPr lvl="1"/>
@@ -4527,11 +4515,7 @@
           <a:p>
             <a:r>
               <a:rPr lang="en-CA" dirty="0" smtClean="0"/>
-              <a:t>Staging </a:t>
-            </a:r>
-            <a:r>
-              <a:rPr lang="en-CA" dirty="0" smtClean="0"/>
-              <a:t>and committing</a:t>
+              <a:t>Staging and committing</a:t>
             </a:r>
             <a:endParaRPr lang="en-CA" dirty="0"/>
           </a:p>
@@ -4940,11 +4924,7 @@
           <a:p>
             <a:r>
               <a:rPr lang="en-CA" dirty="0" smtClean="0"/>
-              <a:t>Staging </a:t>
-            </a:r>
-            <a:r>
-              <a:rPr lang="en-CA" dirty="0" smtClean="0"/>
-              <a:t>and committing</a:t>
+              <a:t>Staging and committing</a:t>
             </a:r>
             <a:endParaRPr lang="en-CA" dirty="0"/>
           </a:p>
@@ -5690,11 +5670,7 @@
           <a:p>
             <a:r>
               <a:rPr lang="en-CA" dirty="0" smtClean="0"/>
-              <a:t>Staging </a:t>
-            </a:r>
-            <a:r>
-              <a:rPr lang="en-CA" dirty="0" smtClean="0"/>
-              <a:t>and committing</a:t>
+              <a:t>Staging and committing</a:t>
             </a:r>
             <a:endParaRPr lang="en-CA" dirty="0"/>
           </a:p>
@@ -6296,11 +6272,7 @@
           <a:p>
             <a:r>
               <a:rPr lang="en-CA" dirty="0" smtClean="0"/>
-              <a:t>Staging </a:t>
-            </a:r>
-            <a:r>
-              <a:rPr lang="en-CA" dirty="0" smtClean="0"/>
-              <a:t>and committing</a:t>
+              <a:t>Staging and committing</a:t>
             </a:r>
             <a:endParaRPr lang="en-CA" dirty="0"/>
           </a:p>
@@ -8649,19 +8621,7 @@
           <a:p>
             <a:r>
               <a:rPr lang="en-CA" dirty="0" smtClean="0"/>
-              <a:t>With a partner: </a:t>
-            </a:r>
-            <a:r>
-              <a:rPr lang="en-CA" dirty="0" smtClean="0"/>
-              <a:t>Create a new repository, and play </a:t>
-            </a:r>
-            <a:r>
-              <a:rPr lang="en-CA" dirty="0" smtClean="0"/>
-              <a:t>Hangman, tracking each change of the </a:t>
-            </a:r>
-            <a:r>
-              <a:rPr lang="en-CA" dirty="0" smtClean="0"/>
-              <a:t>game with a commit</a:t>
+              <a:t>With a partner: Create a new repository, and play Hangman, tracking each change of the game with a commit</a:t>
             </a:r>
             <a:endParaRPr lang="en-CA" dirty="0"/>
           </a:p>
@@ -8968,8 +8928,18 @@
           <a:lstStyle/>
           <a:p>
             <a:r>
+              <a:rPr lang="en-CA" sz="4400" dirty="0" smtClean="0"/>
+              <a:t>Branching</a:t>
+            </a:r>
+          </a:p>
+          <a:p>
+            <a:r>
+              <a:rPr lang="en-CA" sz="4400" dirty="0" smtClean="0"/>
+              <a:t>Remote </a:t>
+            </a:r>
+            <a:r>
               <a:rPr lang="en-CA" sz="4400" dirty="0"/>
-              <a:t>Remote repositories (aka: collaborating with </a:t>
+              <a:t>repositories (aka: collaborating with </a:t>
             </a:r>
             <a:r>
               <a:rPr lang="en-CA" sz="4400" dirty="0" err="1"/>
@@ -8978,12 +8948,6 @@
             <a:r>
               <a:rPr lang="en-CA" sz="4400" dirty="0" smtClean="0"/>
               <a:t>!)</a:t>
-            </a:r>
-          </a:p>
-          <a:p>
-            <a:r>
-              <a:rPr lang="en-CA" sz="4400" dirty="0" smtClean="0"/>
-              <a:t>Branching</a:t>
             </a:r>
           </a:p>
           <a:p>
@@ -12862,7 +12826,12 @@
             <p:ph type="title"/>
           </p:nvPr>
         </p:nvSpPr>
-        <p:spPr/>
+        <p:spPr>
+          <a:xfrm>
+            <a:off x="893597" y="103868"/>
+            <a:ext cx="10515600" cy="1325563"/>
+          </a:xfrm>
+        </p:spPr>
         <p:txBody>
           <a:bodyPr/>
           <a:lstStyle/>
@@ -12885,21 +12854,703 @@
             <p:ph idx="1"/>
           </p:nvPr>
         </p:nvSpPr>
-        <p:spPr/>
+        <p:spPr>
+          <a:xfrm>
+            <a:off x="893597" y="1418626"/>
+            <a:ext cx="10515600" cy="4351338"/>
+          </a:xfrm>
+        </p:spPr>
         <p:txBody>
           <a:bodyPr/>
           <a:lstStyle/>
           <a:p>
+            <a:pPr marL="0" indent="0">
+              <a:buNone/>
+            </a:pPr>
             <a:r>
               <a:rPr lang="en-CA" sz="4000" dirty="0" smtClean="0"/>
               <a:t>Used to test new ideas without changing your main analysis</a:t>
             </a:r>
           </a:p>
           <a:p>
+            <a:endParaRPr lang="en-CA" sz="4000" dirty="0" smtClean="0"/>
+          </a:p>
+          <a:p>
             <a:endParaRPr lang="en-CA" dirty="0"/>
           </a:p>
         </p:txBody>
       </p:sp>
+      <p:cxnSp>
+        <p:nvCxnSpPr>
+          <p:cNvPr id="8" name="Straight Arrow Connector 7"/>
+          <p:cNvCxnSpPr>
+            <a:stCxn id="4" idx="6"/>
+            <a:endCxn id="6" idx="2"/>
+          </p:cNvCxnSpPr>
+          <p:nvPr/>
+        </p:nvCxnSpPr>
+        <p:spPr>
+          <a:xfrm>
+            <a:off x="1683657" y="4190775"/>
+            <a:ext cx="1796144" cy="0"/>
+          </a:xfrm>
+          <a:prstGeom prst="straightConnector1">
+            <a:avLst/>
+          </a:prstGeom>
+          <a:ln w="38100">
+            <a:solidFill>
+              <a:schemeClr val="tx1"/>
+            </a:solidFill>
+            <a:tailEnd type="arrow"/>
+          </a:ln>
+        </p:spPr>
+        <p:style>
+          <a:lnRef idx="1">
+            <a:schemeClr val="accent1"/>
+          </a:lnRef>
+          <a:fillRef idx="0">
+            <a:schemeClr val="accent1"/>
+          </a:fillRef>
+          <a:effectRef idx="0">
+            <a:schemeClr val="accent1"/>
+          </a:effectRef>
+          <a:fontRef idx="minor">
+            <a:schemeClr val="tx1"/>
+          </a:fontRef>
+        </p:style>
+      </p:cxnSp>
+      <p:cxnSp>
+        <p:nvCxnSpPr>
+          <p:cNvPr id="9" name="Straight Arrow Connector 8"/>
+          <p:cNvCxnSpPr>
+            <a:stCxn id="6" idx="6"/>
+            <a:endCxn id="5" idx="2"/>
+          </p:cNvCxnSpPr>
+          <p:nvPr/>
+        </p:nvCxnSpPr>
+        <p:spPr>
+          <a:xfrm>
+            <a:off x="4365172" y="4190775"/>
+            <a:ext cx="1638300" cy="25174"/>
+          </a:xfrm>
+          <a:prstGeom prst="straightConnector1">
+            <a:avLst/>
+          </a:prstGeom>
+          <a:ln w="38100">
+            <a:solidFill>
+              <a:schemeClr val="tx1"/>
+            </a:solidFill>
+            <a:tailEnd type="arrow"/>
+          </a:ln>
+        </p:spPr>
+        <p:style>
+          <a:lnRef idx="1">
+            <a:schemeClr val="accent1"/>
+          </a:lnRef>
+          <a:fillRef idx="0">
+            <a:schemeClr val="accent1"/>
+          </a:fillRef>
+          <a:effectRef idx="0">
+            <a:schemeClr val="accent1"/>
+          </a:effectRef>
+          <a:fontRef idx="minor">
+            <a:schemeClr val="tx1"/>
+          </a:fontRef>
+        </p:style>
+      </p:cxnSp>
+      <p:sp>
+        <p:nvSpPr>
+          <p:cNvPr id="4" name="Oval 3"/>
+          <p:cNvSpPr/>
+          <p:nvPr/>
+        </p:nvSpPr>
+        <p:spPr>
+          <a:xfrm>
+            <a:off x="798286" y="3748089"/>
+            <a:ext cx="885371" cy="885371"/>
+          </a:xfrm>
+          <a:prstGeom prst="ellipse">
+            <a:avLst/>
+          </a:prstGeom>
+        </p:spPr>
+        <p:style>
+          <a:lnRef idx="2">
+            <a:schemeClr val="accent1">
+              <a:shade val="50000"/>
+            </a:schemeClr>
+          </a:lnRef>
+          <a:fillRef idx="1">
+            <a:schemeClr val="accent1"/>
+          </a:fillRef>
+          <a:effectRef idx="0">
+            <a:schemeClr val="accent1"/>
+          </a:effectRef>
+          <a:fontRef idx="minor">
+            <a:schemeClr val="lt1"/>
+          </a:fontRef>
+        </p:style>
+        <p:txBody>
+          <a:bodyPr rtlCol="0" anchor="ctr"/>
+          <a:lstStyle/>
+          <a:p>
+            <a:pPr algn="ctr"/>
+            <a:endParaRPr lang="en-CA"/>
+          </a:p>
+        </p:txBody>
+      </p:sp>
+      <p:sp>
+        <p:nvSpPr>
+          <p:cNvPr id="14" name="TextBox 13"/>
+          <p:cNvSpPr txBox="1"/>
+          <p:nvPr/>
+        </p:nvSpPr>
+        <p:spPr>
+          <a:xfrm>
+            <a:off x="399651" y="2594765"/>
+            <a:ext cx="1682640" cy="1200329"/>
+          </a:xfrm>
+          <a:prstGeom prst="rect">
+            <a:avLst/>
+          </a:prstGeom>
+          <a:noFill/>
+        </p:spPr>
+        <p:txBody>
+          <a:bodyPr wrap="none" rtlCol="0">
+            <a:spAutoFit/>
+          </a:bodyPr>
+          <a:lstStyle/>
+          <a:p>
+            <a:pPr algn="ctr"/>
+            <a:r>
+              <a:rPr lang="en-CA" sz="2400" dirty="0" smtClean="0"/>
+              <a:t>A1CD4B</a:t>
+            </a:r>
+          </a:p>
+          <a:p>
+            <a:pPr algn="ctr"/>
+            <a:r>
+              <a:rPr lang="en-CA" sz="2400" dirty="0" smtClean="0"/>
+              <a:t>“developed </a:t>
+            </a:r>
+          </a:p>
+          <a:p>
+            <a:pPr algn="ctr"/>
+            <a:r>
+              <a:rPr lang="en-CA" sz="2400" dirty="0" smtClean="0"/>
+              <a:t>model”</a:t>
+            </a:r>
+          </a:p>
+        </p:txBody>
+      </p:sp>
+      <p:sp>
+        <p:nvSpPr>
+          <p:cNvPr id="5" name="Oval 4"/>
+          <p:cNvSpPr/>
+          <p:nvPr/>
+        </p:nvSpPr>
+        <p:spPr>
+          <a:xfrm>
+            <a:off x="6003472" y="3773263"/>
+            <a:ext cx="885371" cy="885371"/>
+          </a:xfrm>
+          <a:prstGeom prst="ellipse">
+            <a:avLst/>
+          </a:prstGeom>
+        </p:spPr>
+        <p:style>
+          <a:lnRef idx="2">
+            <a:schemeClr val="accent1">
+              <a:shade val="50000"/>
+            </a:schemeClr>
+          </a:lnRef>
+          <a:fillRef idx="1">
+            <a:schemeClr val="accent1"/>
+          </a:fillRef>
+          <a:effectRef idx="0">
+            <a:schemeClr val="accent1"/>
+          </a:effectRef>
+          <a:fontRef idx="minor">
+            <a:schemeClr val="lt1"/>
+          </a:fontRef>
+        </p:style>
+        <p:txBody>
+          <a:bodyPr rtlCol="0" anchor="ctr"/>
+          <a:lstStyle/>
+          <a:p>
+            <a:pPr algn="ctr"/>
+            <a:endParaRPr lang="en-CA"/>
+          </a:p>
+        </p:txBody>
+      </p:sp>
+      <p:sp>
+        <p:nvSpPr>
+          <p:cNvPr id="15" name="TextBox 14"/>
+          <p:cNvSpPr txBox="1"/>
+          <p:nvPr/>
+        </p:nvSpPr>
+        <p:spPr>
+          <a:xfrm>
+            <a:off x="5187665" y="2648856"/>
+            <a:ext cx="2507418" cy="1200329"/>
+          </a:xfrm>
+          <a:prstGeom prst="rect">
+            <a:avLst/>
+          </a:prstGeom>
+          <a:noFill/>
+        </p:spPr>
+        <p:txBody>
+          <a:bodyPr wrap="none" rtlCol="0">
+            <a:spAutoFit/>
+          </a:bodyPr>
+          <a:lstStyle/>
+          <a:p>
+            <a:pPr algn="ctr"/>
+            <a:r>
+              <a:rPr lang="en-CA" sz="2400" dirty="0" smtClean="0"/>
+              <a:t>EF35B2</a:t>
+            </a:r>
+          </a:p>
+          <a:p>
+            <a:pPr algn="ctr"/>
+            <a:r>
+              <a:rPr lang="en-CA" sz="2400" dirty="0" smtClean="0"/>
+              <a:t>“made line plot of </a:t>
+            </a:r>
+          </a:p>
+          <a:p>
+            <a:pPr algn="ctr"/>
+            <a:r>
+              <a:rPr lang="en-CA" sz="2400" dirty="0" smtClean="0"/>
+              <a:t>predictions”</a:t>
+            </a:r>
+          </a:p>
+        </p:txBody>
+      </p:sp>
+      <p:sp>
+        <p:nvSpPr>
+          <p:cNvPr id="6" name="Oval 5"/>
+          <p:cNvSpPr/>
+          <p:nvPr/>
+        </p:nvSpPr>
+        <p:spPr>
+          <a:xfrm>
+            <a:off x="3479801" y="3748089"/>
+            <a:ext cx="885371" cy="885371"/>
+          </a:xfrm>
+          <a:prstGeom prst="ellipse">
+            <a:avLst/>
+          </a:prstGeom>
+        </p:spPr>
+        <p:style>
+          <a:lnRef idx="2">
+            <a:schemeClr val="accent1">
+              <a:shade val="50000"/>
+            </a:schemeClr>
+          </a:lnRef>
+          <a:fillRef idx="1">
+            <a:schemeClr val="accent1"/>
+          </a:fillRef>
+          <a:effectRef idx="0">
+            <a:schemeClr val="accent1"/>
+          </a:effectRef>
+          <a:fontRef idx="minor">
+            <a:schemeClr val="lt1"/>
+          </a:fontRef>
+        </p:style>
+        <p:txBody>
+          <a:bodyPr rtlCol="0" anchor="ctr"/>
+          <a:lstStyle/>
+          <a:p>
+            <a:pPr algn="ctr"/>
+            <a:endParaRPr lang="en-CA"/>
+          </a:p>
+        </p:txBody>
+      </p:sp>
+      <p:sp>
+        <p:nvSpPr>
+          <p:cNvPr id="16" name="TextBox 15"/>
+          <p:cNvSpPr txBox="1"/>
+          <p:nvPr/>
+        </p:nvSpPr>
+        <p:spPr>
+          <a:xfrm>
+            <a:off x="2665438" y="2630995"/>
+            <a:ext cx="2514096" cy="1200329"/>
+          </a:xfrm>
+          <a:prstGeom prst="rect">
+            <a:avLst/>
+          </a:prstGeom>
+          <a:noFill/>
+        </p:spPr>
+        <p:txBody>
+          <a:bodyPr wrap="square" rtlCol="0">
+            <a:spAutoFit/>
+          </a:bodyPr>
+          <a:lstStyle/>
+          <a:p>
+            <a:pPr algn="ctr"/>
+            <a:r>
+              <a:rPr lang="en-CA" sz="2400" dirty="0" smtClean="0"/>
+              <a:t>1476B5</a:t>
+            </a:r>
+          </a:p>
+          <a:p>
+            <a:pPr algn="ctr"/>
+            <a:r>
+              <a:rPr lang="en-CA" sz="2400" dirty="0" smtClean="0"/>
+              <a:t>“Generated predictions”</a:t>
+            </a:r>
+          </a:p>
+        </p:txBody>
+      </p:sp>
+      <p:cxnSp>
+        <p:nvCxnSpPr>
+          <p:cNvPr id="23" name="Straight Arrow Connector 22"/>
+          <p:cNvCxnSpPr>
+            <a:stCxn id="6" idx="5"/>
+            <a:endCxn id="26" idx="2"/>
+          </p:cNvCxnSpPr>
+          <p:nvPr/>
+        </p:nvCxnSpPr>
+        <p:spPr>
+          <a:xfrm>
+            <a:off x="4235512" y="4503800"/>
+            <a:ext cx="3133865" cy="1751857"/>
+          </a:xfrm>
+          <a:prstGeom prst="straightConnector1">
+            <a:avLst/>
+          </a:prstGeom>
+          <a:ln w="38100">
+            <a:solidFill>
+              <a:schemeClr val="tx1"/>
+            </a:solidFill>
+            <a:tailEnd type="arrow"/>
+          </a:ln>
+        </p:spPr>
+        <p:style>
+          <a:lnRef idx="1">
+            <a:schemeClr val="accent1"/>
+          </a:lnRef>
+          <a:fillRef idx="0">
+            <a:schemeClr val="accent1"/>
+          </a:fillRef>
+          <a:effectRef idx="0">
+            <a:schemeClr val="accent1"/>
+          </a:effectRef>
+          <a:fontRef idx="minor">
+            <a:schemeClr val="tx1"/>
+          </a:fontRef>
+        </p:style>
+      </p:cxnSp>
+      <p:sp>
+        <p:nvSpPr>
+          <p:cNvPr id="26" name="Oval 25"/>
+          <p:cNvSpPr/>
+          <p:nvPr/>
+        </p:nvSpPr>
+        <p:spPr>
+          <a:xfrm>
+            <a:off x="7369377" y="5812971"/>
+            <a:ext cx="885371" cy="885371"/>
+          </a:xfrm>
+          <a:prstGeom prst="ellipse">
+            <a:avLst/>
+          </a:prstGeom>
+        </p:spPr>
+        <p:style>
+          <a:lnRef idx="2">
+            <a:schemeClr val="accent2">
+              <a:shade val="50000"/>
+            </a:schemeClr>
+          </a:lnRef>
+          <a:fillRef idx="1">
+            <a:schemeClr val="accent2"/>
+          </a:fillRef>
+          <a:effectRef idx="0">
+            <a:schemeClr val="accent2"/>
+          </a:effectRef>
+          <a:fontRef idx="minor">
+            <a:schemeClr val="lt1"/>
+          </a:fontRef>
+        </p:style>
+        <p:txBody>
+          <a:bodyPr rtlCol="0" anchor="ctr"/>
+          <a:lstStyle/>
+          <a:p>
+            <a:pPr algn="ctr"/>
+            <a:endParaRPr lang="en-CA"/>
+          </a:p>
+        </p:txBody>
+      </p:sp>
+      <p:sp>
+        <p:nvSpPr>
+          <p:cNvPr id="31" name="TextBox 30"/>
+          <p:cNvSpPr txBox="1"/>
+          <p:nvPr/>
+        </p:nvSpPr>
+        <p:spPr>
+          <a:xfrm>
+            <a:off x="6429829" y="4511857"/>
+            <a:ext cx="2813453" cy="1200329"/>
+          </a:xfrm>
+          <a:prstGeom prst="rect">
+            <a:avLst/>
+          </a:prstGeom>
+          <a:noFill/>
+        </p:spPr>
+        <p:txBody>
+          <a:bodyPr wrap="square" rtlCol="0">
+            <a:spAutoFit/>
+          </a:bodyPr>
+          <a:lstStyle/>
+          <a:p>
+            <a:pPr algn="ctr"/>
+            <a:r>
+              <a:rPr lang="en-CA" sz="2400" dirty="0" smtClean="0"/>
+              <a:t>34A3E9</a:t>
+            </a:r>
+          </a:p>
+          <a:p>
+            <a:pPr algn="ctr"/>
+            <a:r>
+              <a:rPr lang="en-CA" sz="2400" dirty="0" smtClean="0"/>
+              <a:t>“Created histogram of predictions”</a:t>
+            </a:r>
+          </a:p>
+        </p:txBody>
+      </p:sp>
+      <p:cxnSp>
+        <p:nvCxnSpPr>
+          <p:cNvPr id="39" name="Straight Arrow Connector 38"/>
+          <p:cNvCxnSpPr>
+            <a:stCxn id="26" idx="6"/>
+            <a:endCxn id="44" idx="2"/>
+          </p:cNvCxnSpPr>
+          <p:nvPr/>
+        </p:nvCxnSpPr>
+        <p:spPr>
+          <a:xfrm>
+            <a:off x="8254748" y="6255657"/>
+            <a:ext cx="1802897" cy="4371"/>
+          </a:xfrm>
+          <a:prstGeom prst="straightConnector1">
+            <a:avLst/>
+          </a:prstGeom>
+          <a:ln w="38100">
+            <a:solidFill>
+              <a:schemeClr val="tx1"/>
+            </a:solidFill>
+            <a:tailEnd type="arrow"/>
+          </a:ln>
+        </p:spPr>
+        <p:style>
+          <a:lnRef idx="1">
+            <a:schemeClr val="accent1"/>
+          </a:lnRef>
+          <a:fillRef idx="0">
+            <a:schemeClr val="accent1"/>
+          </a:fillRef>
+          <a:effectRef idx="0">
+            <a:schemeClr val="accent1"/>
+          </a:effectRef>
+          <a:fontRef idx="minor">
+            <a:schemeClr val="tx1"/>
+          </a:fontRef>
+        </p:style>
+      </p:cxnSp>
+      <p:sp>
+        <p:nvSpPr>
+          <p:cNvPr id="44" name="Oval 43"/>
+          <p:cNvSpPr/>
+          <p:nvPr/>
+        </p:nvSpPr>
+        <p:spPr>
+          <a:xfrm>
+            <a:off x="10057645" y="5817342"/>
+            <a:ext cx="885371" cy="885371"/>
+          </a:xfrm>
+          <a:prstGeom prst="ellipse">
+            <a:avLst/>
+          </a:prstGeom>
+        </p:spPr>
+        <p:style>
+          <a:lnRef idx="2">
+            <a:schemeClr val="accent2">
+              <a:shade val="50000"/>
+            </a:schemeClr>
+          </a:lnRef>
+          <a:fillRef idx="1">
+            <a:schemeClr val="accent2"/>
+          </a:fillRef>
+          <a:effectRef idx="0">
+            <a:schemeClr val="accent2"/>
+          </a:effectRef>
+          <a:fontRef idx="minor">
+            <a:schemeClr val="lt1"/>
+          </a:fontRef>
+        </p:style>
+        <p:txBody>
+          <a:bodyPr rtlCol="0" anchor="ctr"/>
+          <a:lstStyle/>
+          <a:p>
+            <a:pPr algn="ctr"/>
+            <a:endParaRPr lang="en-CA"/>
+          </a:p>
+        </p:txBody>
+      </p:sp>
+      <p:sp>
+        <p:nvSpPr>
+          <p:cNvPr id="45" name="TextBox 44"/>
+          <p:cNvSpPr txBox="1"/>
+          <p:nvPr/>
+        </p:nvSpPr>
+        <p:spPr>
+          <a:xfrm>
+            <a:off x="9243282" y="4511857"/>
+            <a:ext cx="2514096" cy="1200329"/>
+          </a:xfrm>
+          <a:prstGeom prst="rect">
+            <a:avLst/>
+          </a:prstGeom>
+          <a:noFill/>
+        </p:spPr>
+        <p:txBody>
+          <a:bodyPr wrap="square" rtlCol="0">
+            <a:spAutoFit/>
+          </a:bodyPr>
+          <a:lstStyle/>
+          <a:p>
+            <a:pPr algn="ctr"/>
+            <a:r>
+              <a:rPr lang="en-CA" sz="2400" dirty="0" smtClean="0"/>
+              <a:t>86AB17</a:t>
+            </a:r>
+          </a:p>
+          <a:p>
+            <a:pPr algn="ctr"/>
+            <a:r>
+              <a:rPr lang="en-CA" sz="2400" dirty="0" smtClean="0"/>
+              <a:t>“Added histogram to assessment”</a:t>
+            </a:r>
+          </a:p>
+        </p:txBody>
+      </p:sp>
+      <p:sp>
+        <p:nvSpPr>
+          <p:cNvPr id="49" name="Oval 48"/>
+          <p:cNvSpPr/>
+          <p:nvPr/>
+        </p:nvSpPr>
+        <p:spPr>
+          <a:xfrm>
+            <a:off x="8800597" y="3773263"/>
+            <a:ext cx="885371" cy="885371"/>
+          </a:xfrm>
+          <a:prstGeom prst="ellipse">
+            <a:avLst/>
+          </a:prstGeom>
+        </p:spPr>
+        <p:style>
+          <a:lnRef idx="2">
+            <a:schemeClr val="accent1">
+              <a:shade val="50000"/>
+            </a:schemeClr>
+          </a:lnRef>
+          <a:fillRef idx="1">
+            <a:schemeClr val="accent1"/>
+          </a:fillRef>
+          <a:effectRef idx="0">
+            <a:schemeClr val="accent1"/>
+          </a:effectRef>
+          <a:fontRef idx="minor">
+            <a:schemeClr val="lt1"/>
+          </a:fontRef>
+        </p:style>
+        <p:txBody>
+          <a:bodyPr rtlCol="0" anchor="ctr"/>
+          <a:lstStyle/>
+          <a:p>
+            <a:pPr algn="ctr"/>
+            <a:endParaRPr lang="en-CA"/>
+          </a:p>
+        </p:txBody>
+      </p:sp>
+      <p:sp>
+        <p:nvSpPr>
+          <p:cNvPr id="50" name="TextBox 49"/>
+          <p:cNvSpPr txBox="1"/>
+          <p:nvPr/>
+        </p:nvSpPr>
+        <p:spPr>
+          <a:xfrm>
+            <a:off x="7981446" y="2467778"/>
+            <a:ext cx="2514096" cy="1200329"/>
+          </a:xfrm>
+          <a:prstGeom prst="rect">
+            <a:avLst/>
+          </a:prstGeom>
+          <a:noFill/>
+        </p:spPr>
+        <p:txBody>
+          <a:bodyPr wrap="square" rtlCol="0">
+            <a:spAutoFit/>
+          </a:bodyPr>
+          <a:lstStyle/>
+          <a:p>
+            <a:pPr algn="ctr"/>
+            <a:r>
+              <a:rPr lang="en-CA" sz="2400" dirty="0" smtClean="0"/>
+              <a:t>86AB17</a:t>
+            </a:r>
+          </a:p>
+          <a:p>
+            <a:pPr algn="ctr"/>
+            <a:r>
+              <a:rPr lang="en-CA" sz="2400" dirty="0" smtClean="0"/>
+              <a:t>“Added line plots to assessment”</a:t>
+            </a:r>
+          </a:p>
+        </p:txBody>
+      </p:sp>
+      <p:cxnSp>
+        <p:nvCxnSpPr>
+          <p:cNvPr id="51" name="Straight Arrow Connector 50"/>
+          <p:cNvCxnSpPr>
+            <a:stCxn id="5" idx="6"/>
+            <a:endCxn id="49" idx="2"/>
+          </p:cNvCxnSpPr>
+          <p:nvPr/>
+        </p:nvCxnSpPr>
+        <p:spPr>
+          <a:xfrm>
+            <a:off x="6888843" y="4215949"/>
+            <a:ext cx="1911754" cy="0"/>
+          </a:xfrm>
+          <a:prstGeom prst="straightConnector1">
+            <a:avLst/>
+          </a:prstGeom>
+          <a:ln w="38100">
+            <a:solidFill>
+              <a:schemeClr val="tx1"/>
+            </a:solidFill>
+            <a:tailEnd type="arrow"/>
+          </a:ln>
+        </p:spPr>
+        <p:style>
+          <a:lnRef idx="1">
+            <a:schemeClr val="accent1"/>
+          </a:lnRef>
+          <a:fillRef idx="0">
+            <a:schemeClr val="accent1"/>
+          </a:fillRef>
+          <a:effectRef idx="0">
+            <a:schemeClr val="accent1"/>
+          </a:effectRef>
+          <a:fontRef idx="minor">
+            <a:schemeClr val="tx1"/>
+          </a:fontRef>
+        </p:style>
+      </p:cxnSp>
     </p:spTree>
     <p:extLst>
       <p:ext uri="{BB962C8B-B14F-4D97-AF65-F5344CB8AC3E}">
@@ -12913,9 +13564,653 @@
   <p:timing>
     <p:tnLst>
       <p:par>
-        <p:cTn id="1" dur="indefinite" restart="never" nodeType="tmRoot"/>
+        <p:cTn id="1" dur="indefinite" restart="never" nodeType="tmRoot">
+          <p:childTnLst>
+            <p:seq concurrent="1" nextAc="seek">
+              <p:cTn id="2" dur="indefinite" nodeType="mainSeq">
+                <p:childTnLst>
+                  <p:par>
+                    <p:cTn id="3" fill="hold">
+                      <p:stCondLst>
+                        <p:cond delay="indefinite"/>
+                      </p:stCondLst>
+                      <p:childTnLst>
+                        <p:par>
+                          <p:cTn id="4" fill="hold">
+                            <p:stCondLst>
+                              <p:cond delay="0"/>
+                            </p:stCondLst>
+                            <p:childTnLst>
+                              <p:par>
+                                <p:cTn id="5" presetID="1" presetClass="entr" presetSubtype="0" fill="hold" grpId="0" nodeType="clickEffect">
+                                  <p:stCondLst>
+                                    <p:cond delay="0"/>
+                                  </p:stCondLst>
+                                  <p:childTnLst>
+                                    <p:set>
+                                      <p:cBhvr>
+                                        <p:cTn id="6" dur="1" fill="hold">
+                                          <p:stCondLst>
+                                            <p:cond delay="0"/>
+                                          </p:stCondLst>
+                                        </p:cTn>
+                                        <p:tgtEl>
+                                          <p:spTgt spid="50"/>
+                                        </p:tgtEl>
+                                        <p:attrNameLst>
+                                          <p:attrName>style.visibility</p:attrName>
+                                        </p:attrNameLst>
+                                      </p:cBhvr>
+                                      <p:to>
+                                        <p:strVal val="visible"/>
+                                      </p:to>
+                                    </p:set>
+                                  </p:childTnLst>
+                                </p:cTn>
+                              </p:par>
+                              <p:par>
+                                <p:cTn id="7" presetID="1" presetClass="entr" presetSubtype="0" fill="hold" grpId="0" nodeType="withEffect">
+                                  <p:stCondLst>
+                                    <p:cond delay="0"/>
+                                  </p:stCondLst>
+                                  <p:childTnLst>
+                                    <p:set>
+                                      <p:cBhvr>
+                                        <p:cTn id="8" dur="1" fill="hold">
+                                          <p:stCondLst>
+                                            <p:cond delay="0"/>
+                                          </p:stCondLst>
+                                        </p:cTn>
+                                        <p:tgtEl>
+                                          <p:spTgt spid="49"/>
+                                        </p:tgtEl>
+                                        <p:attrNameLst>
+                                          <p:attrName>style.visibility</p:attrName>
+                                        </p:attrNameLst>
+                                      </p:cBhvr>
+                                      <p:to>
+                                        <p:strVal val="visible"/>
+                                      </p:to>
+                                    </p:set>
+                                  </p:childTnLst>
+                                </p:cTn>
+                              </p:par>
+                              <p:par>
+                                <p:cTn id="9" presetID="1" presetClass="entr" presetSubtype="0" fill="hold" nodeType="withEffect">
+                                  <p:stCondLst>
+                                    <p:cond delay="0"/>
+                                  </p:stCondLst>
+                                  <p:childTnLst>
+                                    <p:set>
+                                      <p:cBhvr>
+                                        <p:cTn id="10" dur="1" fill="hold">
+                                          <p:stCondLst>
+                                            <p:cond delay="0"/>
+                                          </p:stCondLst>
+                                        </p:cTn>
+                                        <p:tgtEl>
+                                          <p:spTgt spid="51"/>
+                                        </p:tgtEl>
+                                        <p:attrNameLst>
+                                          <p:attrName>style.visibility</p:attrName>
+                                        </p:attrNameLst>
+                                      </p:cBhvr>
+                                      <p:to>
+                                        <p:strVal val="visible"/>
+                                      </p:to>
+                                    </p:set>
+                                  </p:childTnLst>
+                                </p:cTn>
+                              </p:par>
+                              <p:par>
+                                <p:cTn id="11" presetID="1" presetClass="entr" presetSubtype="0" fill="hold" grpId="0" nodeType="withEffect">
+                                  <p:stCondLst>
+                                    <p:cond delay="0"/>
+                                  </p:stCondLst>
+                                  <p:childTnLst>
+                                    <p:set>
+                                      <p:cBhvr>
+                                        <p:cTn id="12" dur="1" fill="hold">
+                                          <p:stCondLst>
+                                            <p:cond delay="0"/>
+                                          </p:stCondLst>
+                                        </p:cTn>
+                                        <p:tgtEl>
+                                          <p:spTgt spid="5"/>
+                                        </p:tgtEl>
+                                        <p:attrNameLst>
+                                          <p:attrName>style.visibility</p:attrName>
+                                        </p:attrNameLst>
+                                      </p:cBhvr>
+                                      <p:to>
+                                        <p:strVal val="visible"/>
+                                      </p:to>
+                                    </p:set>
+                                  </p:childTnLst>
+                                </p:cTn>
+                              </p:par>
+                              <p:par>
+                                <p:cTn id="13" presetID="1" presetClass="entr" presetSubtype="0" fill="hold" nodeType="withEffect">
+                                  <p:stCondLst>
+                                    <p:cond delay="0"/>
+                                  </p:stCondLst>
+                                  <p:childTnLst>
+                                    <p:set>
+                                      <p:cBhvr>
+                                        <p:cTn id="14" dur="1" fill="hold">
+                                          <p:stCondLst>
+                                            <p:cond delay="0"/>
+                                          </p:stCondLst>
+                                        </p:cTn>
+                                        <p:tgtEl>
+                                          <p:spTgt spid="9"/>
+                                        </p:tgtEl>
+                                        <p:attrNameLst>
+                                          <p:attrName>style.visibility</p:attrName>
+                                        </p:attrNameLst>
+                                      </p:cBhvr>
+                                      <p:to>
+                                        <p:strVal val="visible"/>
+                                      </p:to>
+                                    </p:set>
+                                  </p:childTnLst>
+                                </p:cTn>
+                              </p:par>
+                              <p:par>
+                                <p:cTn id="15" presetID="1" presetClass="entr" presetSubtype="0" fill="hold" nodeType="withEffect">
+                                  <p:stCondLst>
+                                    <p:cond delay="0"/>
+                                  </p:stCondLst>
+                                  <p:childTnLst>
+                                    <p:set>
+                                      <p:cBhvr>
+                                        <p:cTn id="16" dur="1" fill="hold">
+                                          <p:stCondLst>
+                                            <p:cond delay="0"/>
+                                          </p:stCondLst>
+                                        </p:cTn>
+                                        <p:tgtEl>
+                                          <p:spTgt spid="8"/>
+                                        </p:tgtEl>
+                                        <p:attrNameLst>
+                                          <p:attrName>style.visibility</p:attrName>
+                                        </p:attrNameLst>
+                                      </p:cBhvr>
+                                      <p:to>
+                                        <p:strVal val="visible"/>
+                                      </p:to>
+                                    </p:set>
+                                  </p:childTnLst>
+                                </p:cTn>
+                              </p:par>
+                              <p:par>
+                                <p:cTn id="17" presetID="1" presetClass="entr" presetSubtype="0" fill="hold" grpId="0" nodeType="withEffect">
+                                  <p:stCondLst>
+                                    <p:cond delay="0"/>
+                                  </p:stCondLst>
+                                  <p:childTnLst>
+                                    <p:set>
+                                      <p:cBhvr>
+                                        <p:cTn id="18" dur="1" fill="hold">
+                                          <p:stCondLst>
+                                            <p:cond delay="0"/>
+                                          </p:stCondLst>
+                                        </p:cTn>
+                                        <p:tgtEl>
+                                          <p:spTgt spid="6"/>
+                                        </p:tgtEl>
+                                        <p:attrNameLst>
+                                          <p:attrName>style.visibility</p:attrName>
+                                        </p:attrNameLst>
+                                      </p:cBhvr>
+                                      <p:to>
+                                        <p:strVal val="visible"/>
+                                      </p:to>
+                                    </p:set>
+                                  </p:childTnLst>
+                                </p:cTn>
+                              </p:par>
+                              <p:par>
+                                <p:cTn id="19" presetID="1" presetClass="entr" presetSubtype="0" fill="hold" grpId="0" nodeType="withEffect">
+                                  <p:stCondLst>
+                                    <p:cond delay="0"/>
+                                  </p:stCondLst>
+                                  <p:childTnLst>
+                                    <p:set>
+                                      <p:cBhvr>
+                                        <p:cTn id="20" dur="1" fill="hold">
+                                          <p:stCondLst>
+                                            <p:cond delay="0"/>
+                                          </p:stCondLst>
+                                        </p:cTn>
+                                        <p:tgtEl>
+                                          <p:spTgt spid="4"/>
+                                        </p:tgtEl>
+                                        <p:attrNameLst>
+                                          <p:attrName>style.visibility</p:attrName>
+                                        </p:attrNameLst>
+                                      </p:cBhvr>
+                                      <p:to>
+                                        <p:strVal val="visible"/>
+                                      </p:to>
+                                    </p:set>
+                                  </p:childTnLst>
+                                </p:cTn>
+                              </p:par>
+                              <p:par>
+                                <p:cTn id="21" presetID="1" presetClass="entr" presetSubtype="0" fill="hold" grpId="0" nodeType="withEffect">
+                                  <p:stCondLst>
+                                    <p:cond delay="0"/>
+                                  </p:stCondLst>
+                                  <p:childTnLst>
+                                    <p:set>
+                                      <p:cBhvr>
+                                        <p:cTn id="22" dur="1" fill="hold">
+                                          <p:stCondLst>
+                                            <p:cond delay="0"/>
+                                          </p:stCondLst>
+                                        </p:cTn>
+                                        <p:tgtEl>
+                                          <p:spTgt spid="14"/>
+                                        </p:tgtEl>
+                                        <p:attrNameLst>
+                                          <p:attrName>style.visibility</p:attrName>
+                                        </p:attrNameLst>
+                                      </p:cBhvr>
+                                      <p:to>
+                                        <p:strVal val="visible"/>
+                                      </p:to>
+                                    </p:set>
+                                  </p:childTnLst>
+                                </p:cTn>
+                              </p:par>
+                              <p:par>
+                                <p:cTn id="23" presetID="1" presetClass="entr" presetSubtype="0" fill="hold" grpId="0" nodeType="withEffect">
+                                  <p:stCondLst>
+                                    <p:cond delay="0"/>
+                                  </p:stCondLst>
+                                  <p:childTnLst>
+                                    <p:set>
+                                      <p:cBhvr>
+                                        <p:cTn id="24" dur="1" fill="hold">
+                                          <p:stCondLst>
+                                            <p:cond delay="0"/>
+                                          </p:stCondLst>
+                                        </p:cTn>
+                                        <p:tgtEl>
+                                          <p:spTgt spid="16"/>
+                                        </p:tgtEl>
+                                        <p:attrNameLst>
+                                          <p:attrName>style.visibility</p:attrName>
+                                        </p:attrNameLst>
+                                      </p:cBhvr>
+                                      <p:to>
+                                        <p:strVal val="visible"/>
+                                      </p:to>
+                                    </p:set>
+                                  </p:childTnLst>
+                                </p:cTn>
+                              </p:par>
+                              <p:par>
+                                <p:cTn id="25" presetID="1" presetClass="entr" presetSubtype="0" fill="hold" grpId="0" nodeType="withEffect">
+                                  <p:stCondLst>
+                                    <p:cond delay="0"/>
+                                  </p:stCondLst>
+                                  <p:childTnLst>
+                                    <p:set>
+                                      <p:cBhvr>
+                                        <p:cTn id="26" dur="1" fill="hold">
+                                          <p:stCondLst>
+                                            <p:cond delay="0"/>
+                                          </p:stCondLst>
+                                        </p:cTn>
+                                        <p:tgtEl>
+                                          <p:spTgt spid="15"/>
+                                        </p:tgtEl>
+                                        <p:attrNameLst>
+                                          <p:attrName>style.visibility</p:attrName>
+                                        </p:attrNameLst>
+                                      </p:cBhvr>
+                                      <p:to>
+                                        <p:strVal val="visible"/>
+                                      </p:to>
+                                    </p:set>
+                                  </p:childTnLst>
+                                </p:cTn>
+                              </p:par>
+                            </p:childTnLst>
+                          </p:cTn>
+                        </p:par>
+                      </p:childTnLst>
+                    </p:cTn>
+                  </p:par>
+                  <p:par>
+                    <p:cTn id="27" fill="hold">
+                      <p:stCondLst>
+                        <p:cond delay="indefinite"/>
+                      </p:stCondLst>
+                      <p:childTnLst>
+                        <p:par>
+                          <p:cTn id="28" fill="hold">
+                            <p:stCondLst>
+                              <p:cond delay="0"/>
+                            </p:stCondLst>
+                            <p:childTnLst>
+                              <p:par>
+                                <p:cTn id="29" presetID="1" presetClass="entr" presetSubtype="0" fill="hold" nodeType="clickEffect">
+                                  <p:stCondLst>
+                                    <p:cond delay="0"/>
+                                  </p:stCondLst>
+                                  <p:childTnLst>
+                                    <p:set>
+                                      <p:cBhvr>
+                                        <p:cTn id="30" dur="1" fill="hold">
+                                          <p:stCondLst>
+                                            <p:cond delay="0"/>
+                                          </p:stCondLst>
+                                        </p:cTn>
+                                        <p:tgtEl>
+                                          <p:spTgt spid="23"/>
+                                        </p:tgtEl>
+                                        <p:attrNameLst>
+                                          <p:attrName>style.visibility</p:attrName>
+                                        </p:attrNameLst>
+                                      </p:cBhvr>
+                                      <p:to>
+                                        <p:strVal val="visible"/>
+                                      </p:to>
+                                    </p:set>
+                                  </p:childTnLst>
+                                </p:cTn>
+                              </p:par>
+                              <p:par>
+                                <p:cTn id="31" presetID="1" presetClass="entr" presetSubtype="0" fill="hold" grpId="0" nodeType="withEffect">
+                                  <p:stCondLst>
+                                    <p:cond delay="0"/>
+                                  </p:stCondLst>
+                                  <p:childTnLst>
+                                    <p:set>
+                                      <p:cBhvr>
+                                        <p:cTn id="32" dur="1" fill="hold">
+                                          <p:stCondLst>
+                                            <p:cond delay="0"/>
+                                          </p:stCondLst>
+                                        </p:cTn>
+                                        <p:tgtEl>
+                                          <p:spTgt spid="26"/>
+                                        </p:tgtEl>
+                                        <p:attrNameLst>
+                                          <p:attrName>style.visibility</p:attrName>
+                                        </p:attrNameLst>
+                                      </p:cBhvr>
+                                      <p:to>
+                                        <p:strVal val="visible"/>
+                                      </p:to>
+                                    </p:set>
+                                  </p:childTnLst>
+                                </p:cTn>
+                              </p:par>
+                              <p:par>
+                                <p:cTn id="33" presetID="1" presetClass="entr" presetSubtype="0" fill="hold" grpId="0" nodeType="withEffect">
+                                  <p:stCondLst>
+                                    <p:cond delay="0"/>
+                                  </p:stCondLst>
+                                  <p:childTnLst>
+                                    <p:set>
+                                      <p:cBhvr>
+                                        <p:cTn id="34" dur="1" fill="hold">
+                                          <p:stCondLst>
+                                            <p:cond delay="0"/>
+                                          </p:stCondLst>
+                                        </p:cTn>
+                                        <p:tgtEl>
+                                          <p:spTgt spid="31"/>
+                                        </p:tgtEl>
+                                        <p:attrNameLst>
+                                          <p:attrName>style.visibility</p:attrName>
+                                        </p:attrNameLst>
+                                      </p:cBhvr>
+                                      <p:to>
+                                        <p:strVal val="visible"/>
+                                      </p:to>
+                                    </p:set>
+                                  </p:childTnLst>
+                                </p:cTn>
+                              </p:par>
+                              <p:par>
+                                <p:cTn id="35" presetID="1" presetClass="entr" presetSubtype="0" fill="hold" nodeType="withEffect">
+                                  <p:stCondLst>
+                                    <p:cond delay="0"/>
+                                  </p:stCondLst>
+                                  <p:childTnLst>
+                                    <p:set>
+                                      <p:cBhvr>
+                                        <p:cTn id="36" dur="1" fill="hold">
+                                          <p:stCondLst>
+                                            <p:cond delay="0"/>
+                                          </p:stCondLst>
+                                        </p:cTn>
+                                        <p:tgtEl>
+                                          <p:spTgt spid="39"/>
+                                        </p:tgtEl>
+                                        <p:attrNameLst>
+                                          <p:attrName>style.visibility</p:attrName>
+                                        </p:attrNameLst>
+                                      </p:cBhvr>
+                                      <p:to>
+                                        <p:strVal val="visible"/>
+                                      </p:to>
+                                    </p:set>
+                                  </p:childTnLst>
+                                </p:cTn>
+                              </p:par>
+                              <p:par>
+                                <p:cTn id="37" presetID="1" presetClass="entr" presetSubtype="0" fill="hold" grpId="0" nodeType="withEffect">
+                                  <p:stCondLst>
+                                    <p:cond delay="0"/>
+                                  </p:stCondLst>
+                                  <p:childTnLst>
+                                    <p:set>
+                                      <p:cBhvr>
+                                        <p:cTn id="38" dur="1" fill="hold">
+                                          <p:stCondLst>
+                                            <p:cond delay="0"/>
+                                          </p:stCondLst>
+                                        </p:cTn>
+                                        <p:tgtEl>
+                                          <p:spTgt spid="44"/>
+                                        </p:tgtEl>
+                                        <p:attrNameLst>
+                                          <p:attrName>style.visibility</p:attrName>
+                                        </p:attrNameLst>
+                                      </p:cBhvr>
+                                      <p:to>
+                                        <p:strVal val="visible"/>
+                                      </p:to>
+                                    </p:set>
+                                  </p:childTnLst>
+                                </p:cTn>
+                              </p:par>
+                              <p:par>
+                                <p:cTn id="39" presetID="1" presetClass="entr" presetSubtype="0" fill="hold" grpId="0" nodeType="withEffect">
+                                  <p:stCondLst>
+                                    <p:cond delay="0"/>
+                                  </p:stCondLst>
+                                  <p:childTnLst>
+                                    <p:set>
+                                      <p:cBhvr>
+                                        <p:cTn id="40" dur="1" fill="hold">
+                                          <p:stCondLst>
+                                            <p:cond delay="0"/>
+                                          </p:stCondLst>
+                                        </p:cTn>
+                                        <p:tgtEl>
+                                          <p:spTgt spid="45"/>
+                                        </p:tgtEl>
+                                        <p:attrNameLst>
+                                          <p:attrName>style.visibility</p:attrName>
+                                        </p:attrNameLst>
+                                      </p:cBhvr>
+                                      <p:to>
+                                        <p:strVal val="visible"/>
+                                      </p:to>
+                                    </p:set>
+                                  </p:childTnLst>
+                                </p:cTn>
+                              </p:par>
+                              <p:par>
+                                <p:cTn id="41" presetID="1" presetClass="exit" presetSubtype="0" fill="hold" grpId="1" nodeType="withEffect">
+                                  <p:stCondLst>
+                                    <p:cond delay="0"/>
+                                  </p:stCondLst>
+                                  <p:childTnLst>
+                                    <p:set>
+                                      <p:cBhvr>
+                                        <p:cTn id="42" dur="1" fill="hold">
+                                          <p:stCondLst>
+                                            <p:cond delay="0"/>
+                                          </p:stCondLst>
+                                        </p:cTn>
+                                        <p:tgtEl>
+                                          <p:spTgt spid="50"/>
+                                        </p:tgtEl>
+                                        <p:attrNameLst>
+                                          <p:attrName>style.visibility</p:attrName>
+                                        </p:attrNameLst>
+                                      </p:cBhvr>
+                                      <p:to>
+                                        <p:strVal val="hidden"/>
+                                      </p:to>
+                                    </p:set>
+                                  </p:childTnLst>
+                                </p:cTn>
+                              </p:par>
+                              <p:par>
+                                <p:cTn id="43" presetID="1" presetClass="exit" presetSubtype="0" fill="hold" grpId="1" nodeType="withEffect">
+                                  <p:stCondLst>
+                                    <p:cond delay="0"/>
+                                  </p:stCondLst>
+                                  <p:childTnLst>
+                                    <p:set>
+                                      <p:cBhvr>
+                                        <p:cTn id="44" dur="1" fill="hold">
+                                          <p:stCondLst>
+                                            <p:cond delay="0"/>
+                                          </p:stCondLst>
+                                        </p:cTn>
+                                        <p:tgtEl>
+                                          <p:spTgt spid="14"/>
+                                        </p:tgtEl>
+                                        <p:attrNameLst>
+                                          <p:attrName>style.visibility</p:attrName>
+                                        </p:attrNameLst>
+                                      </p:cBhvr>
+                                      <p:to>
+                                        <p:strVal val="hidden"/>
+                                      </p:to>
+                                    </p:set>
+                                  </p:childTnLst>
+                                </p:cTn>
+                              </p:par>
+                              <p:par>
+                                <p:cTn id="45" presetID="1" presetClass="exit" presetSubtype="0" fill="hold" grpId="1" nodeType="withEffect">
+                                  <p:stCondLst>
+                                    <p:cond delay="0"/>
+                                  </p:stCondLst>
+                                  <p:childTnLst>
+                                    <p:set>
+                                      <p:cBhvr>
+                                        <p:cTn id="46" dur="1" fill="hold">
+                                          <p:stCondLst>
+                                            <p:cond delay="0"/>
+                                          </p:stCondLst>
+                                        </p:cTn>
+                                        <p:tgtEl>
+                                          <p:spTgt spid="16"/>
+                                        </p:tgtEl>
+                                        <p:attrNameLst>
+                                          <p:attrName>style.visibility</p:attrName>
+                                        </p:attrNameLst>
+                                      </p:cBhvr>
+                                      <p:to>
+                                        <p:strVal val="hidden"/>
+                                      </p:to>
+                                    </p:set>
+                                  </p:childTnLst>
+                                </p:cTn>
+                              </p:par>
+                              <p:par>
+                                <p:cTn id="47" presetID="1" presetClass="exit" presetSubtype="0" fill="hold" grpId="1" nodeType="withEffect">
+                                  <p:stCondLst>
+                                    <p:cond delay="0"/>
+                                  </p:stCondLst>
+                                  <p:childTnLst>
+                                    <p:set>
+                                      <p:cBhvr>
+                                        <p:cTn id="48" dur="1" fill="hold">
+                                          <p:stCondLst>
+                                            <p:cond delay="0"/>
+                                          </p:stCondLst>
+                                        </p:cTn>
+                                        <p:tgtEl>
+                                          <p:spTgt spid="15"/>
+                                        </p:tgtEl>
+                                        <p:attrNameLst>
+                                          <p:attrName>style.visibility</p:attrName>
+                                        </p:attrNameLst>
+                                      </p:cBhvr>
+                                      <p:to>
+                                        <p:strVal val="hidden"/>
+                                      </p:to>
+                                    </p:set>
+                                  </p:childTnLst>
+                                </p:cTn>
+                              </p:par>
+                            </p:childTnLst>
+                          </p:cTn>
+                        </p:par>
+                      </p:childTnLst>
+                    </p:cTn>
+                  </p:par>
+                </p:childTnLst>
+              </p:cTn>
+              <p:prevCondLst>
+                <p:cond evt="onPrev" delay="0">
+                  <p:tgtEl>
+                    <p:sldTgt/>
+                  </p:tgtEl>
+                </p:cond>
+              </p:prevCondLst>
+              <p:nextCondLst>
+                <p:cond evt="onNext" delay="0">
+                  <p:tgtEl>
+                    <p:sldTgt/>
+                  </p:tgtEl>
+                </p:cond>
+              </p:nextCondLst>
+            </p:seq>
+          </p:childTnLst>
+        </p:cTn>
       </p:par>
     </p:tnLst>
+    <p:bldLst>
+      <p:bldP spid="4" grpId="0" animBg="1"/>
+      <p:bldP spid="14" grpId="0"/>
+      <p:bldP spid="14" grpId="1"/>
+      <p:bldP spid="5" grpId="0" animBg="1"/>
+      <p:bldP spid="15" grpId="0"/>
+      <p:bldP spid="15" grpId="1"/>
+      <p:bldP spid="6" grpId="0" animBg="1"/>
+      <p:bldP spid="16" grpId="0"/>
+      <p:bldP spid="16" grpId="1"/>
+      <p:bldP spid="26" grpId="0" animBg="1"/>
+      <p:bldP spid="31" grpId="0"/>
+      <p:bldP spid="44" grpId="0" animBg="1"/>
+      <p:bldP spid="45" grpId="0"/>
+      <p:bldP spid="49" grpId="0" animBg="1"/>
+      <p:bldP spid="50" grpId="0"/>
+      <p:bldP spid="50" grpId="1"/>
+    </p:bldLst>
   </p:timing>
 </p:sld>
 </file>
@@ -13110,25 +14405,6 @@
           </a:p>
         </p:txBody>
       </p:sp>
-      <p:sp>
-        <p:nvSpPr>
-          <p:cNvPr id="3" name="Content Placeholder 2"/>
-          <p:cNvSpPr>
-            <a:spLocks noGrp="1"/>
-          </p:cNvSpPr>
-          <p:nvPr>
-            <p:ph idx="1"/>
-          </p:nvPr>
-        </p:nvSpPr>
-        <p:spPr/>
-        <p:txBody>
-          <a:bodyPr/>
-          <a:lstStyle/>
-          <a:p>
-            <a:endParaRPr lang="en-CA" dirty="0"/>
-          </a:p>
-        </p:txBody>
-      </p:sp>
       <p:pic>
         <p:nvPicPr>
           <p:cNvPr id="4" name="Content Placeholder 8"/>
@@ -13150,7 +14426,7 @@
         </p:blipFill>
         <p:spPr>
           <a:xfrm>
-            <a:off x="2329570" y="1807522"/>
+            <a:off x="2614390" y="1502722"/>
             <a:ext cx="6963220" cy="5050478"/>
           </a:xfrm>
           <a:prstGeom prst="rect">
@@ -13212,6 +14488,96 @@
           <a:p>
             <a:r>
               <a:rPr lang="en-CA" dirty="0" smtClean="0"/>
+              <a:t>Branches</a:t>
+            </a:r>
+            <a:endParaRPr lang="en-CA" dirty="0"/>
+          </a:p>
+        </p:txBody>
+      </p:sp>
+      <p:pic>
+        <p:nvPicPr>
+          <p:cNvPr id="4" name="Content Placeholder 8"/>
+          <p:cNvPicPr>
+            <a:picLocks noChangeAspect="1"/>
+          </p:cNvPicPr>
+          <p:nvPr/>
+        </p:nvPicPr>
+        <p:blipFill>
+          <a:blip r:embed="rId2">
+            <a:extLst>
+              <a:ext uri="{28A0092B-C50C-407E-A947-70E740481C1C}">
+                <a14:useLocalDpi xmlns:a14="http://schemas.microsoft.com/office/drawing/2010/main" val="0"/>
+              </a:ext>
+            </a:extLst>
+          </a:blip>
+          <a:stretch>
+            <a:fillRect/>
+          </a:stretch>
+        </p:blipFill>
+        <p:spPr>
+          <a:xfrm>
+            <a:off x="2560938" y="1585677"/>
+            <a:ext cx="7070125" cy="4937865"/>
+          </a:xfrm>
+          <a:prstGeom prst="rect">
+            <a:avLst/>
+          </a:prstGeom>
+        </p:spPr>
+      </p:pic>
+    </p:spTree>
+    <p:extLst>
+      <p:ext uri="{BB962C8B-B14F-4D97-AF65-F5344CB8AC3E}">
+        <p14:creationId xmlns:p14="http://schemas.microsoft.com/office/powerpoint/2010/main" val="1336333595"/>
+      </p:ext>
+    </p:extLst>
+  </p:cSld>
+  <p:clrMapOvr>
+    <a:masterClrMapping/>
+  </p:clrMapOvr>
+  <p:timing>
+    <p:tnLst>
+      <p:par>
+        <p:cTn id="1" dur="indefinite" restart="never" nodeType="tmRoot"/>
+      </p:par>
+    </p:tnLst>
+  </p:timing>
+</p:sld>
+</file>
+
+<file path=ppt/slides/slide32.xml><?xml version="1.0" encoding="utf-8"?>
+<p:sld xmlns:a="http://schemas.openxmlformats.org/drawingml/2006/main" xmlns:r="http://schemas.openxmlformats.org/officeDocument/2006/relationships" xmlns:p="http://schemas.openxmlformats.org/presentationml/2006/main">
+  <p:cSld>
+    <p:spTree>
+      <p:nvGrpSpPr>
+        <p:cNvPr id="1" name=""/>
+        <p:cNvGrpSpPr/>
+        <p:nvPr/>
+      </p:nvGrpSpPr>
+      <p:grpSpPr>
+        <a:xfrm>
+          <a:off x="0" y="0"/>
+          <a:ext cx="0" cy="0"/>
+          <a:chOff x="0" y="0"/>
+          <a:chExt cx="0" cy="0"/>
+        </a:xfrm>
+      </p:grpSpPr>
+      <p:sp>
+        <p:nvSpPr>
+          <p:cNvPr id="2" name="Title 1"/>
+          <p:cNvSpPr>
+            <a:spLocks noGrp="1"/>
+          </p:cNvSpPr>
+          <p:nvPr>
+            <p:ph type="title"/>
+          </p:nvPr>
+        </p:nvSpPr>
+        <p:spPr/>
+        <p:txBody>
+          <a:bodyPr/>
+          <a:lstStyle/>
+          <a:p>
+            <a:r>
+              <a:rPr lang="en-CA" dirty="0" smtClean="0"/>
               <a:t>Useful tricks</a:t>
             </a:r>
             <a:endParaRPr lang="en-CA" dirty="0"/>
@@ -13318,7 +14684,7 @@
 </p:sld>
 </file>
 
-<file path=ppt/slides/slide32.xml><?xml version="1.0" encoding="utf-8"?>
+<file path=ppt/slides/slide33.xml><?xml version="1.0" encoding="utf-8"?>
 <p:sld xmlns:a="http://schemas.openxmlformats.org/drawingml/2006/main" xmlns:r="http://schemas.openxmlformats.org/officeDocument/2006/relationships" xmlns:p="http://schemas.openxmlformats.org/presentationml/2006/main">
   <p:cSld>
     <p:spTree>
@@ -13485,7 +14851,7 @@
 </p:sld>
 </file>
 
-<file path=ppt/slides/slide33.xml><?xml version="1.0" encoding="utf-8"?>
+<file path=ppt/slides/slide34.xml><?xml version="1.0" encoding="utf-8"?>
 <p:sld xmlns:a="http://schemas.openxmlformats.org/drawingml/2006/main" xmlns:r="http://schemas.openxmlformats.org/officeDocument/2006/relationships" xmlns:p="http://schemas.openxmlformats.org/presentationml/2006/main">
   <p:cSld>
     <p:spTree>
@@ -13626,7 +14992,7 @@
 </p:sld>
 </file>
 
-<file path=ppt/slides/slide34.xml><?xml version="1.0" encoding="utf-8"?>
+<file path=ppt/slides/slide35.xml><?xml version="1.0" encoding="utf-8"?>
 <p:sld xmlns:a="http://schemas.openxmlformats.org/drawingml/2006/main" xmlns:r="http://schemas.openxmlformats.org/officeDocument/2006/relationships" xmlns:p="http://schemas.openxmlformats.org/presentationml/2006/main">
   <p:cSld>
     <p:spTree>
@@ -13911,7 +15277,7 @@
 </p:sld>
 </file>
 
-<file path=ppt/slides/slide35.xml><?xml version="1.0" encoding="utf-8"?>
+<file path=ppt/slides/slide36.xml><?xml version="1.0" encoding="utf-8"?>
 <p:sld xmlns:a="http://schemas.openxmlformats.org/drawingml/2006/main" xmlns:r="http://schemas.openxmlformats.org/officeDocument/2006/relationships" xmlns:p="http://schemas.openxmlformats.org/presentationml/2006/main">
   <p:cSld>
     <p:spTree>

</xml_diff>

<commit_message>
Moved exercises to the script file for simplicity
</commit_message>
<xml_diff>
--- a/dfo_git_workshop/Using version control.pptx
+++ b/dfo_git_workshop/Using version control.pptx
@@ -25,7 +25,7 @@
     <p:sldId id="274" r:id="rId16"/>
     <p:sldId id="273" r:id="rId17"/>
     <p:sldId id="276" r:id="rId18"/>
-    <p:sldId id="291" r:id="rId19"/>
+    <p:sldId id="300" r:id="rId19"/>
     <p:sldId id="286" r:id="rId20"/>
     <p:sldId id="284" r:id="rId21"/>
     <p:sldId id="285" r:id="rId22"/>
@@ -144,7 +144,7 @@
   </p:defaultTextStyle>
   <p:extLst>
     <p:ext uri="{EFAFB233-063F-42B5-8137-9DF3F51BA10A}">
-      <p15:sldGuideLst xmlns:p15="http://schemas.microsoft.com/office/powerpoint/2012/main" xmlns=""/>
+      <p15:sldGuideLst xmlns="" xmlns:p15="http://schemas.microsoft.com/office/powerpoint/2012/main"/>
     </p:ext>
   </p:extLst>
 </p:presentation>
@@ -232,7 +232,7 @@
           <a:p>
             <a:fld id="{419EAFB0-D06D-49D8-BD59-4B489921E9EB}" type="datetimeFigureOut">
               <a:rPr lang="en-CA" smtClean="0"/>
-              <a:t>2017-12-01</a:t>
+              <a:t>2017-12-04</a:t>
             </a:fld>
             <a:endParaRPr lang="en-CA"/>
           </a:p>
@@ -870,7 +870,7 @@
           <a:p>
             <a:fld id="{0EC1CE10-7A36-4A3B-849C-60992C6CD584}" type="datetimeFigureOut">
               <a:rPr lang="en-CA" smtClean="0"/>
-              <a:t>2017-12-01</a:t>
+              <a:t>2017-12-04</a:t>
             </a:fld>
             <a:endParaRPr lang="en-CA"/>
           </a:p>
@@ -1040,7 +1040,7 @@
           <a:p>
             <a:fld id="{0EC1CE10-7A36-4A3B-849C-60992C6CD584}" type="datetimeFigureOut">
               <a:rPr lang="en-CA" smtClean="0"/>
-              <a:t>2017-12-01</a:t>
+              <a:t>2017-12-04</a:t>
             </a:fld>
             <a:endParaRPr lang="en-CA"/>
           </a:p>
@@ -1220,7 +1220,7 @@
           <a:p>
             <a:fld id="{0EC1CE10-7A36-4A3B-849C-60992C6CD584}" type="datetimeFigureOut">
               <a:rPr lang="en-CA" smtClean="0"/>
-              <a:t>2017-12-01</a:t>
+              <a:t>2017-12-04</a:t>
             </a:fld>
             <a:endParaRPr lang="en-CA"/>
           </a:p>
@@ -1390,7 +1390,7 @@
           <a:p>
             <a:fld id="{0EC1CE10-7A36-4A3B-849C-60992C6CD584}" type="datetimeFigureOut">
               <a:rPr lang="en-CA" smtClean="0"/>
-              <a:t>2017-12-01</a:t>
+              <a:t>2017-12-04</a:t>
             </a:fld>
             <a:endParaRPr lang="en-CA"/>
           </a:p>
@@ -1636,7 +1636,7 @@
           <a:p>
             <a:fld id="{0EC1CE10-7A36-4A3B-849C-60992C6CD584}" type="datetimeFigureOut">
               <a:rPr lang="en-CA" smtClean="0"/>
-              <a:t>2017-12-01</a:t>
+              <a:t>2017-12-04</a:t>
             </a:fld>
             <a:endParaRPr lang="en-CA"/>
           </a:p>
@@ -1868,7 +1868,7 @@
           <a:p>
             <a:fld id="{0EC1CE10-7A36-4A3B-849C-60992C6CD584}" type="datetimeFigureOut">
               <a:rPr lang="en-CA" smtClean="0"/>
-              <a:t>2017-12-01</a:t>
+              <a:t>2017-12-04</a:t>
             </a:fld>
             <a:endParaRPr lang="en-CA"/>
           </a:p>
@@ -2235,7 +2235,7 @@
           <a:p>
             <a:fld id="{0EC1CE10-7A36-4A3B-849C-60992C6CD584}" type="datetimeFigureOut">
               <a:rPr lang="en-CA" smtClean="0"/>
-              <a:t>2017-12-01</a:t>
+              <a:t>2017-12-04</a:t>
             </a:fld>
             <a:endParaRPr lang="en-CA"/>
           </a:p>
@@ -2353,7 +2353,7 @@
           <a:p>
             <a:fld id="{0EC1CE10-7A36-4A3B-849C-60992C6CD584}" type="datetimeFigureOut">
               <a:rPr lang="en-CA" smtClean="0"/>
-              <a:t>2017-12-01</a:t>
+              <a:t>2017-12-04</a:t>
             </a:fld>
             <a:endParaRPr lang="en-CA"/>
           </a:p>
@@ -2448,7 +2448,7 @@
           <a:p>
             <a:fld id="{0EC1CE10-7A36-4A3B-849C-60992C6CD584}" type="datetimeFigureOut">
               <a:rPr lang="en-CA" smtClean="0"/>
-              <a:t>2017-12-01</a:t>
+              <a:t>2017-12-04</a:t>
             </a:fld>
             <a:endParaRPr lang="en-CA"/>
           </a:p>
@@ -2725,7 +2725,7 @@
           <a:p>
             <a:fld id="{0EC1CE10-7A36-4A3B-849C-60992C6CD584}" type="datetimeFigureOut">
               <a:rPr lang="en-CA" smtClean="0"/>
-              <a:t>2017-12-01</a:t>
+              <a:t>2017-12-04</a:t>
             </a:fld>
             <a:endParaRPr lang="en-CA"/>
           </a:p>
@@ -2982,7 +2982,7 @@
           <a:p>
             <a:fld id="{0EC1CE10-7A36-4A3B-849C-60992C6CD584}" type="datetimeFigureOut">
               <a:rPr lang="en-CA" smtClean="0"/>
-              <a:t>2017-12-01</a:t>
+              <a:t>2017-12-04</a:t>
             </a:fld>
             <a:endParaRPr lang="en-CA"/>
           </a:p>
@@ -3195,7 +3195,7 @@
           <a:p>
             <a:fld id="{0EC1CE10-7A36-4A3B-849C-60992C6CD584}" type="datetimeFigureOut">
               <a:rPr lang="en-CA" smtClean="0"/>
-              <a:t>2017-12-01</a:t>
+              <a:t>2017-12-04</a:t>
             </a:fld>
             <a:endParaRPr lang="en-CA"/>
           </a:p>
@@ -3747,29 +3747,48 @@
           <a:p>
             <a:r>
               <a:rPr lang="en-CA" sz="3600" dirty="0" smtClean="0"/>
-              <a:t>Slightly more advanced (if I have time):</a:t>
-            </a:r>
+              <a:t>Slightly more advanced </a:t>
+            </a:r>
+            <a:r>
+              <a:rPr lang="en-CA" sz="3600" dirty="0" smtClean="0"/>
+              <a:t>(in the second half)</a:t>
+            </a:r>
+            <a:endParaRPr lang="en-CA" sz="3600" dirty="0" smtClean="0"/>
           </a:p>
           <a:p>
             <a:pPr lvl="1"/>
             <a:r>
               <a:rPr lang="en-CA" sz="3600" dirty="0" smtClean="0"/>
-              <a:t>Going back in time with branches</a:t>
+              <a:t>Collaborating </a:t>
+            </a:r>
+            <a:r>
+              <a:rPr lang="en-CA" sz="3600" dirty="0" smtClean="0"/>
+              <a:t>using local and remote </a:t>
+            </a:r>
+            <a:r>
+              <a:rPr lang="en-CA" sz="3600" dirty="0" smtClean="0"/>
+              <a:t>repositories</a:t>
             </a:r>
           </a:p>
           <a:p>
             <a:pPr lvl="1"/>
             <a:r>
+              <a:rPr lang="en-CA" sz="3600" dirty="0"/>
+              <a:t>Going back in time with </a:t>
+            </a:r>
+            <a:r>
               <a:rPr lang="en-CA" sz="3600" dirty="0" smtClean="0"/>
-              <a:t>Collaborating using local and remote repositories</a:t>
-            </a:r>
+              <a:t>branches</a:t>
+            </a:r>
+            <a:endParaRPr lang="en-CA" sz="3600" dirty="0" smtClean="0"/>
           </a:p>
           <a:p>
             <a:pPr lvl="1"/>
             <a:r>
               <a:rPr lang="en-CA" sz="3600" dirty="0" smtClean="0"/>
-              <a:t>ignoring files</a:t>
-            </a:r>
+              <a:t>Other useful tricks </a:t>
+            </a:r>
+            <a:endParaRPr lang="en-CA" sz="3600" dirty="0" smtClean="0"/>
           </a:p>
         </p:txBody>
       </p:sp>
@@ -7413,7 +7432,7 @@
           <a:p>
             <a:r>
               <a:rPr lang="en-CA" dirty="0" smtClean="0"/>
-              <a:t>Exercise (10 minutes):</a:t>
+              <a:t>Let’s view this in code</a:t>
             </a:r>
             <a:endParaRPr lang="en-CA" dirty="0"/>
           </a:p>
@@ -7432,45 +7451,52 @@
         <p:spPr/>
         <p:txBody>
           <a:bodyPr>
-            <a:normAutofit lnSpcReduction="10000"/>
+            <a:normAutofit fontScale="92500"/>
           </a:bodyPr>
           <a:lstStyle/>
           <a:p>
-            <a:pPr marL="742950" indent="-742950">
-              <a:buFont typeface="+mj-lt"/>
-              <a:buAutoNum type="arabicPeriod"/>
+            <a:r>
+              <a:rPr lang="en-CA" sz="4800" dirty="0" smtClean="0"/>
+              <a:t>Open up a console</a:t>
+            </a:r>
+          </a:p>
+          <a:p>
+            <a:pPr marL="0" indent="0">
+              <a:buNone/>
             </a:pPr>
             <a:r>
-              <a:rPr lang="en-CA" sz="3600" dirty="0" smtClean="0"/>
-              <a:t>Try making a few new changes to the three files we made (file_1, file_2, </a:t>
-            </a:r>
-            <a:r>
-              <a:rPr lang="en-CA" sz="3600" dirty="0" err="1" smtClean="0"/>
-              <a:t>data_file</a:t>
-            </a:r>
-            <a:r>
-              <a:rPr lang="en-CA" sz="3600" dirty="0" smtClean="0"/>
-              <a:t>).  Try to do at least two new commits. </a:t>
-            </a:r>
-          </a:p>
-          <a:p>
-            <a:pPr marL="742950" indent="-742950">
-              <a:buFont typeface="+mj-lt"/>
-              <a:buAutoNum type="arabicPeriod"/>
+              <a:rPr lang="en-CA" sz="4400" b="1" dirty="0" smtClean="0"/>
+              <a:t>On Windows: </a:t>
+            </a:r>
+            <a:r>
+              <a:rPr lang="en-CA" sz="4400" dirty="0" smtClean="0"/>
+              <a:t>Press start, the search “git bash”</a:t>
+            </a:r>
+            <a:endParaRPr lang="en-CA" sz="4400" dirty="0"/>
+          </a:p>
+          <a:p>
+            <a:pPr marL="0" indent="0">
+              <a:buNone/>
             </a:pPr>
             <a:r>
-              <a:rPr lang="en-CA" sz="3600" dirty="0" smtClean="0"/>
-              <a:t>Try deleting one of the three files. What happens to the git status? </a:t>
-            </a:r>
-          </a:p>
-          <a:p>
-            <a:pPr marL="742950" indent="-742950">
-              <a:buFont typeface="+mj-lt"/>
-              <a:buAutoNum type="arabicPeriod"/>
+              <a:rPr lang="en-CA" sz="4800" b="1" dirty="0" smtClean="0"/>
+              <a:t>On Mac: </a:t>
+            </a:r>
+            <a:r>
+              <a:rPr lang="en-CA" sz="4800" dirty="0" smtClean="0"/>
+              <a:t>Use the finder to search “terminal”</a:t>
+            </a:r>
+          </a:p>
+          <a:p>
+            <a:pPr marL="0" indent="0">
+              <a:buNone/>
             </a:pPr>
-            <a:r>
-              <a:rPr lang="en-CA" sz="3600" dirty="0" smtClean="0"/>
-              <a:t>Try renaming one of the two remaining files without changing its contents (you don’t have to do this in the console). What does this do to the git status?</a:t>
+            <a:endParaRPr lang="en-CA" sz="4800" dirty="0" smtClean="0"/>
+          </a:p>
+          <a:p>
+            <a:r>
+              <a:rPr lang="en-CA" sz="4800" dirty="0" smtClean="0"/>
+              <a:t>Open the script file I sent</a:t>
             </a:r>
           </a:p>
         </p:txBody>
@@ -7478,7 +7504,7 @@
     </p:spTree>
     <p:extLst>
       <p:ext uri="{BB962C8B-B14F-4D97-AF65-F5344CB8AC3E}">
-        <p14:creationId xmlns:p14="http://schemas.microsoft.com/office/powerpoint/2010/main" val="3823412050"/>
+        <p14:creationId xmlns:p14="http://schemas.microsoft.com/office/powerpoint/2010/main" val="3084322589"/>
       </p:ext>
     </p:extLst>
   </p:cSld>
@@ -16305,7 +16331,203 @@
   <p:timing>
     <p:tnLst>
       <p:par>
-        <p:cTn id="1" dur="indefinite" restart="never" nodeType="tmRoot"/>
+        <p:cTn id="1" dur="indefinite" restart="never" nodeType="tmRoot">
+          <p:childTnLst>
+            <p:seq concurrent="1" nextAc="seek">
+              <p:cTn id="2" dur="indefinite" nodeType="mainSeq">
+                <p:childTnLst>
+                  <p:par>
+                    <p:cTn id="3" fill="hold">
+                      <p:stCondLst>
+                        <p:cond delay="indefinite"/>
+                      </p:stCondLst>
+                      <p:childTnLst>
+                        <p:par>
+                          <p:cTn id="4" fill="hold">
+                            <p:stCondLst>
+                              <p:cond delay="0"/>
+                            </p:stCondLst>
+                            <p:childTnLst>
+                              <p:par>
+                                <p:cTn id="5" presetID="1" presetClass="entr" presetSubtype="0" fill="hold" nodeType="clickEffect">
+                                  <p:stCondLst>
+                                    <p:cond delay="0"/>
+                                  </p:stCondLst>
+                                  <p:childTnLst>
+                                    <p:set>
+                                      <p:cBhvr>
+                                        <p:cTn id="6" dur="1" fill="hold">
+                                          <p:stCondLst>
+                                            <p:cond delay="0"/>
+                                          </p:stCondLst>
+                                        </p:cTn>
+                                        <p:tgtEl>
+                                          <p:spTgt spid="3">
+                                            <p:txEl>
+                                              <p:pRg st="4" end="4"/>
+                                            </p:txEl>
+                                          </p:spTgt>
+                                        </p:tgtEl>
+                                        <p:attrNameLst>
+                                          <p:attrName>style.visibility</p:attrName>
+                                        </p:attrNameLst>
+                                      </p:cBhvr>
+                                      <p:to>
+                                        <p:strVal val="visible"/>
+                                      </p:to>
+                                    </p:set>
+                                  </p:childTnLst>
+                                </p:cTn>
+                              </p:par>
+                              <p:par>
+                                <p:cTn id="7" presetID="1" presetClass="entr" presetSubtype="0" fill="hold" nodeType="withEffect">
+                                  <p:stCondLst>
+                                    <p:cond delay="0"/>
+                                  </p:stCondLst>
+                                  <p:childTnLst>
+                                    <p:set>
+                                      <p:cBhvr>
+                                        <p:cTn id="8" dur="1" fill="hold">
+                                          <p:stCondLst>
+                                            <p:cond delay="0"/>
+                                          </p:stCondLst>
+                                        </p:cTn>
+                                        <p:tgtEl>
+                                          <p:spTgt spid="3">
+                                            <p:txEl>
+                                              <p:pRg st="5" end="5"/>
+                                            </p:txEl>
+                                          </p:spTgt>
+                                        </p:tgtEl>
+                                        <p:attrNameLst>
+                                          <p:attrName>style.visibility</p:attrName>
+                                        </p:attrNameLst>
+                                      </p:cBhvr>
+                                      <p:to>
+                                        <p:strVal val="visible"/>
+                                      </p:to>
+                                    </p:set>
+                                  </p:childTnLst>
+                                </p:cTn>
+                              </p:par>
+                              <p:par>
+                                <p:cTn id="9" presetID="1" presetClass="entr" presetSubtype="0" fill="hold" nodeType="withEffect">
+                                  <p:stCondLst>
+                                    <p:cond delay="0"/>
+                                  </p:stCondLst>
+                                  <p:childTnLst>
+                                    <p:set>
+                                      <p:cBhvr>
+                                        <p:cTn id="10" dur="1" fill="hold">
+                                          <p:stCondLst>
+                                            <p:cond delay="0"/>
+                                          </p:stCondLst>
+                                        </p:cTn>
+                                        <p:tgtEl>
+                                          <p:spTgt spid="3">
+                                            <p:txEl>
+                                              <p:pRg st="6" end="6"/>
+                                            </p:txEl>
+                                          </p:spTgt>
+                                        </p:tgtEl>
+                                        <p:attrNameLst>
+                                          <p:attrName>style.visibility</p:attrName>
+                                        </p:attrNameLst>
+                                      </p:cBhvr>
+                                      <p:to>
+                                        <p:strVal val="visible"/>
+                                      </p:to>
+                                    </p:set>
+                                  </p:childTnLst>
+                                </p:cTn>
+                              </p:par>
+                              <p:par>
+                                <p:cTn id="11" presetID="1" presetClass="entr" presetSubtype="0" fill="hold" nodeType="withEffect">
+                                  <p:stCondLst>
+                                    <p:cond delay="0"/>
+                                  </p:stCondLst>
+                                  <p:childTnLst>
+                                    <p:set>
+                                      <p:cBhvr>
+                                        <p:cTn id="12" dur="1" fill="hold">
+                                          <p:stCondLst>
+                                            <p:cond delay="0"/>
+                                          </p:stCondLst>
+                                        </p:cTn>
+                                        <p:tgtEl>
+                                          <p:spTgt spid="3">
+                                            <p:txEl>
+                                              <p:pRg st="7" end="7"/>
+                                            </p:txEl>
+                                          </p:spTgt>
+                                        </p:tgtEl>
+                                        <p:attrNameLst>
+                                          <p:attrName>style.visibility</p:attrName>
+                                        </p:attrNameLst>
+                                      </p:cBhvr>
+                                      <p:to>
+                                        <p:strVal val="visible"/>
+                                      </p:to>
+                                    </p:set>
+                                  </p:childTnLst>
+                                </p:cTn>
+                              </p:par>
+                              <p:par>
+                                <p:cTn id="13" presetID="1" presetClass="entr" presetSubtype="0" fill="hold" nodeType="withEffect">
+                                  <p:stCondLst>
+                                    <p:cond delay="0"/>
+                                  </p:stCondLst>
+                                  <p:childTnLst>
+                                    <p:set>
+                                      <p:cBhvr>
+                                        <p:cTn id="14" dur="1" fill="hold">
+                                          <p:stCondLst>
+                                            <p:cond delay="0"/>
+                                          </p:stCondLst>
+                                        </p:cTn>
+                                        <p:tgtEl>
+                                          <p:spTgt spid="3">
+                                            <p:txEl>
+                                              <p:pRg st="8" end="8"/>
+                                            </p:txEl>
+                                          </p:spTgt>
+                                        </p:tgtEl>
+                                        <p:attrNameLst>
+                                          <p:attrName>style.visibility</p:attrName>
+                                        </p:attrNameLst>
+                                      </p:cBhvr>
+                                      <p:to>
+                                        <p:strVal val="visible"/>
+                                      </p:to>
+                                    </p:set>
+                                  </p:childTnLst>
+                                </p:cTn>
+                              </p:par>
+                            </p:childTnLst>
+                          </p:cTn>
+                        </p:par>
+                      </p:childTnLst>
+                    </p:cTn>
+                  </p:par>
+                </p:childTnLst>
+              </p:cTn>
+              <p:prevCondLst>
+                <p:cond evt="onPrev" delay="0">
+                  <p:tgtEl>
+                    <p:sldTgt/>
+                  </p:tgtEl>
+                </p:cond>
+              </p:prevCondLst>
+              <p:nextCondLst>
+                <p:cond evt="onNext" delay="0">
+                  <p:tgtEl>
+                    <p:sldTgt/>
+                  </p:tgtEl>
+                </p:cond>
+              </p:nextCondLst>
+            </p:seq>
+          </p:childTnLst>
+        </p:cTn>
       </p:par>
     </p:tnLst>
   </p:timing>
@@ -16370,7 +16592,7 @@
         </p:spPr>
         <p:txBody>
           <a:bodyPr>
-            <a:normAutofit/>
+            <a:normAutofit lnSpcReduction="10000"/>
           </a:bodyPr>
           <a:lstStyle/>
           <a:p>
@@ -16408,8 +16630,13 @@
           <a:p>
             <a:r>
               <a:rPr lang="en-CA" sz="3600" dirty="0" smtClean="0"/>
-              <a:t>Can put things on GitHub (more about this at the end)</a:t>
-            </a:r>
+              <a:t>Can put things on GitHub (more about this </a:t>
+            </a:r>
+            <a:r>
+              <a:rPr lang="en-CA" sz="3600" dirty="0" smtClean="0"/>
+              <a:t>in the second half)</a:t>
+            </a:r>
+            <a:endParaRPr lang="en-CA" sz="3600" dirty="0" smtClean="0"/>
           </a:p>
         </p:txBody>
       </p:sp>
@@ -16484,7 +16711,226 @@
   <p:timing>
     <p:tnLst>
       <p:par>
-        <p:cTn id="1" dur="indefinite" restart="never" nodeType="tmRoot"/>
+        <p:cTn id="1" dur="indefinite" restart="never" nodeType="tmRoot">
+          <p:childTnLst>
+            <p:seq concurrent="1" nextAc="seek">
+              <p:cTn id="2" dur="indefinite" nodeType="mainSeq">
+                <p:childTnLst>
+                  <p:par>
+                    <p:cTn id="3" fill="hold">
+                      <p:stCondLst>
+                        <p:cond delay="indefinite"/>
+                      </p:stCondLst>
+                      <p:childTnLst>
+                        <p:par>
+                          <p:cTn id="4" fill="hold">
+                            <p:stCondLst>
+                              <p:cond delay="0"/>
+                            </p:stCondLst>
+                            <p:childTnLst>
+                              <p:par>
+                                <p:cTn id="5" presetID="1" presetClass="entr" presetSubtype="0" fill="hold" nodeType="clickEffect">
+                                  <p:stCondLst>
+                                    <p:cond delay="0"/>
+                                  </p:stCondLst>
+                                  <p:childTnLst>
+                                    <p:set>
+                                      <p:cBhvr>
+                                        <p:cTn id="6" dur="1" fill="hold">
+                                          <p:stCondLst>
+                                            <p:cond delay="0"/>
+                                          </p:stCondLst>
+                                        </p:cTn>
+                                        <p:tgtEl>
+                                          <p:spTgt spid="3">
+                                            <p:txEl>
+                                              <p:pRg st="1" end="1"/>
+                                            </p:txEl>
+                                          </p:spTgt>
+                                        </p:tgtEl>
+                                        <p:attrNameLst>
+                                          <p:attrName>style.visibility</p:attrName>
+                                        </p:attrNameLst>
+                                      </p:cBhvr>
+                                      <p:to>
+                                        <p:strVal val="visible"/>
+                                      </p:to>
+                                    </p:set>
+                                  </p:childTnLst>
+                                </p:cTn>
+                              </p:par>
+                            </p:childTnLst>
+                          </p:cTn>
+                        </p:par>
+                      </p:childTnLst>
+                    </p:cTn>
+                  </p:par>
+                  <p:par>
+                    <p:cTn id="7" fill="hold">
+                      <p:stCondLst>
+                        <p:cond delay="indefinite"/>
+                      </p:stCondLst>
+                      <p:childTnLst>
+                        <p:par>
+                          <p:cTn id="8" fill="hold">
+                            <p:stCondLst>
+                              <p:cond delay="0"/>
+                            </p:stCondLst>
+                            <p:childTnLst>
+                              <p:par>
+                                <p:cTn id="9" presetID="1" presetClass="entr" presetSubtype="0" fill="hold" nodeType="clickEffect">
+                                  <p:stCondLst>
+                                    <p:cond delay="0"/>
+                                  </p:stCondLst>
+                                  <p:childTnLst>
+                                    <p:set>
+                                      <p:cBhvr>
+                                        <p:cTn id="10" dur="1" fill="hold">
+                                          <p:stCondLst>
+                                            <p:cond delay="0"/>
+                                          </p:stCondLst>
+                                        </p:cTn>
+                                        <p:tgtEl>
+                                          <p:spTgt spid="3">
+                                            <p:txEl>
+                                              <p:pRg st="2" end="2"/>
+                                            </p:txEl>
+                                          </p:spTgt>
+                                        </p:tgtEl>
+                                        <p:attrNameLst>
+                                          <p:attrName>style.visibility</p:attrName>
+                                        </p:attrNameLst>
+                                      </p:cBhvr>
+                                      <p:to>
+                                        <p:strVal val="visible"/>
+                                      </p:to>
+                                    </p:set>
+                                  </p:childTnLst>
+                                </p:cTn>
+                              </p:par>
+                            </p:childTnLst>
+                          </p:cTn>
+                        </p:par>
+                      </p:childTnLst>
+                    </p:cTn>
+                  </p:par>
+                  <p:par>
+                    <p:cTn id="11" fill="hold">
+                      <p:stCondLst>
+                        <p:cond delay="indefinite"/>
+                      </p:stCondLst>
+                      <p:childTnLst>
+                        <p:par>
+                          <p:cTn id="12" fill="hold">
+                            <p:stCondLst>
+                              <p:cond delay="0"/>
+                            </p:stCondLst>
+                            <p:childTnLst>
+                              <p:par>
+                                <p:cTn id="13" presetID="1" presetClass="entr" presetSubtype="0" fill="hold" nodeType="clickEffect">
+                                  <p:stCondLst>
+                                    <p:cond delay="0"/>
+                                  </p:stCondLst>
+                                  <p:childTnLst>
+                                    <p:set>
+                                      <p:cBhvr>
+                                        <p:cTn id="14" dur="1" fill="hold">
+                                          <p:stCondLst>
+                                            <p:cond delay="0"/>
+                                          </p:stCondLst>
+                                        </p:cTn>
+                                        <p:tgtEl>
+                                          <p:spTgt spid="3">
+                                            <p:txEl>
+                                              <p:pRg st="3" end="3"/>
+                                            </p:txEl>
+                                          </p:spTgt>
+                                        </p:tgtEl>
+                                        <p:attrNameLst>
+                                          <p:attrName>style.visibility</p:attrName>
+                                        </p:attrNameLst>
+                                      </p:cBhvr>
+                                      <p:to>
+                                        <p:strVal val="visible"/>
+                                      </p:to>
+                                    </p:set>
+                                  </p:childTnLst>
+                                </p:cTn>
+                              </p:par>
+                            </p:childTnLst>
+                          </p:cTn>
+                        </p:par>
+                      </p:childTnLst>
+                    </p:cTn>
+                  </p:par>
+                  <p:par>
+                    <p:cTn id="15" fill="hold">
+                      <p:stCondLst>
+                        <p:cond delay="indefinite"/>
+                      </p:stCondLst>
+                      <p:childTnLst>
+                        <p:par>
+                          <p:cTn id="16" fill="hold">
+                            <p:stCondLst>
+                              <p:cond delay="0"/>
+                            </p:stCondLst>
+                            <p:childTnLst>
+                              <p:par>
+                                <p:cTn id="17" presetID="1" presetClass="entr" presetSubtype="0" fill="hold" nodeType="clickEffect">
+                                  <p:stCondLst>
+                                    <p:cond delay="0"/>
+                                  </p:stCondLst>
+                                  <p:childTnLst>
+                                    <p:set>
+                                      <p:cBhvr>
+                                        <p:cTn id="18" dur="1" fill="hold">
+                                          <p:stCondLst>
+                                            <p:cond delay="0"/>
+                                          </p:stCondLst>
+                                        </p:cTn>
+                                        <p:tgtEl>
+                                          <p:spTgt spid="3">
+                                            <p:txEl>
+                                              <p:pRg st="4" end="4"/>
+                                            </p:txEl>
+                                          </p:spTgt>
+                                        </p:tgtEl>
+                                        <p:attrNameLst>
+                                          <p:attrName>style.visibility</p:attrName>
+                                        </p:attrNameLst>
+                                      </p:cBhvr>
+                                      <p:to>
+                                        <p:strVal val="visible"/>
+                                      </p:to>
+                                    </p:set>
+                                  </p:childTnLst>
+                                </p:cTn>
+                              </p:par>
+                            </p:childTnLst>
+                          </p:cTn>
+                        </p:par>
+                      </p:childTnLst>
+                    </p:cTn>
+                  </p:par>
+                </p:childTnLst>
+              </p:cTn>
+              <p:prevCondLst>
+                <p:cond evt="onPrev" delay="0">
+                  <p:tgtEl>
+                    <p:sldTgt/>
+                  </p:tgtEl>
+                </p:cond>
+              </p:prevCondLst>
+              <p:nextCondLst>
+                <p:cond evt="onNext" delay="0">
+                  <p:tgtEl>
+                    <p:sldTgt/>
+                  </p:tgtEl>
+                </p:cond>
+              </p:nextCondLst>
+            </p:seq>
+          </p:childTnLst>
+        </p:cTn>
       </p:par>
     </p:tnLst>
   </p:timing>
@@ -16893,7 +17339,7 @@
   <a:extraClrSchemeLst/>
   <a:extLst>
     <a:ext uri="{05A4C25C-085E-4340-85A3-A5531E510DB2}">
-      <thm15:themeFamily xmlns:thm15="http://schemas.microsoft.com/office/thememl/2012/main" xmlns="" name="Office Theme" id="{62F939B6-93AF-4DB8-9C6B-D6C7DFDC589F}" vid="{4F46216B-77A9-411A-B9D3-5023FCB70208}"/>
+      <thm15:themeFamily xmlns="" xmlns:thm15="http://schemas.microsoft.com/office/thememl/2012/main" name="Office Theme" id="{62F939B6-93AF-4DB8-9C6B-D6C7DFDC589F}" vid="{4F46216B-77A9-411A-B9D3-5023FCB70208}"/>
     </a:ext>
   </a:extLst>
 </a:theme>

</xml_diff>

<commit_message>
Final version of the powerpoint prior to workshop
</commit_message>
<xml_diff>
--- a/dfo_git_workshop/Using version control.pptx
+++ b/dfo_git_workshop/Using version control.pptx
@@ -5,7 +5,7 @@
     <p:sldMasterId id="2147483684" r:id="rId1"/>
   </p:sldMasterIdLst>
   <p:notesMasterIdLst>
-    <p:notesMasterId r:id="rId38"/>
+    <p:notesMasterId r:id="rId39"/>
   </p:notesMasterIdLst>
   <p:sldIdLst>
     <p:sldId id="256" r:id="rId2"/>
@@ -36,14 +36,15 @@
     <p:sldId id="287" r:id="rId27"/>
     <p:sldId id="296" r:id="rId28"/>
     <p:sldId id="297" r:id="rId29"/>
-    <p:sldId id="294" r:id="rId30"/>
-    <p:sldId id="288" r:id="rId31"/>
-    <p:sldId id="299" r:id="rId32"/>
-    <p:sldId id="289" r:id="rId33"/>
-    <p:sldId id="290" r:id="rId34"/>
-    <p:sldId id="298" r:id="rId35"/>
-    <p:sldId id="268" r:id="rId36"/>
-    <p:sldId id="282" r:id="rId37"/>
+    <p:sldId id="301" r:id="rId30"/>
+    <p:sldId id="294" r:id="rId31"/>
+    <p:sldId id="288" r:id="rId32"/>
+    <p:sldId id="299" r:id="rId33"/>
+    <p:sldId id="289" r:id="rId34"/>
+    <p:sldId id="290" r:id="rId35"/>
+    <p:sldId id="298" r:id="rId36"/>
+    <p:sldId id="268" r:id="rId37"/>
+    <p:sldId id="282" r:id="rId38"/>
   </p:sldIdLst>
   <p:sldSz cx="12192000" cy="6858000"/>
   <p:notesSz cx="6858000" cy="9144000"/>
@@ -144,7 +145,7 @@
   </p:defaultTextStyle>
   <p:extLst>
     <p:ext uri="{EFAFB233-063F-42B5-8137-9DF3F51BA10A}">
-      <p15:sldGuideLst xmlns="" xmlns:p15="http://schemas.microsoft.com/office/powerpoint/2012/main"/>
+      <p15:sldGuideLst xmlns:p15="http://schemas.microsoft.com/office/powerpoint/2012/main" xmlns=""/>
     </p:ext>
   </p:extLst>
 </p:presentation>
@@ -232,7 +233,7 @@
           <a:p>
             <a:fld id="{419EAFB0-D06D-49D8-BD59-4B489921E9EB}" type="datetimeFigureOut">
               <a:rPr lang="en-CA" smtClean="0"/>
-              <a:t>2017-12-04</a:t>
+              <a:t>2017-12-06</a:t>
             </a:fld>
             <a:endParaRPr lang="en-CA"/>
           </a:p>
@@ -1074,7 +1075,7 @@
           <a:p>
             <a:fld id="{0EC1CE10-7A36-4A3B-849C-60992C6CD584}" type="datetimeFigureOut">
               <a:rPr lang="en-CA" smtClean="0"/>
-              <a:t>2017-12-04</a:t>
+              <a:t>2017-12-06</a:t>
             </a:fld>
             <a:endParaRPr lang="en-CA"/>
           </a:p>
@@ -1244,7 +1245,7 @@
           <a:p>
             <a:fld id="{0EC1CE10-7A36-4A3B-849C-60992C6CD584}" type="datetimeFigureOut">
               <a:rPr lang="en-CA" smtClean="0"/>
-              <a:t>2017-12-04</a:t>
+              <a:t>2017-12-06</a:t>
             </a:fld>
             <a:endParaRPr lang="en-CA"/>
           </a:p>
@@ -1424,7 +1425,7 @@
           <a:p>
             <a:fld id="{0EC1CE10-7A36-4A3B-849C-60992C6CD584}" type="datetimeFigureOut">
               <a:rPr lang="en-CA" smtClean="0"/>
-              <a:t>2017-12-04</a:t>
+              <a:t>2017-12-06</a:t>
             </a:fld>
             <a:endParaRPr lang="en-CA"/>
           </a:p>
@@ -1594,7 +1595,7 @@
           <a:p>
             <a:fld id="{0EC1CE10-7A36-4A3B-849C-60992C6CD584}" type="datetimeFigureOut">
               <a:rPr lang="en-CA" smtClean="0"/>
-              <a:t>2017-12-04</a:t>
+              <a:t>2017-12-06</a:t>
             </a:fld>
             <a:endParaRPr lang="en-CA"/>
           </a:p>
@@ -1840,7 +1841,7 @@
           <a:p>
             <a:fld id="{0EC1CE10-7A36-4A3B-849C-60992C6CD584}" type="datetimeFigureOut">
               <a:rPr lang="en-CA" smtClean="0"/>
-              <a:t>2017-12-04</a:t>
+              <a:t>2017-12-06</a:t>
             </a:fld>
             <a:endParaRPr lang="en-CA"/>
           </a:p>
@@ -2072,7 +2073,7 @@
           <a:p>
             <a:fld id="{0EC1CE10-7A36-4A3B-849C-60992C6CD584}" type="datetimeFigureOut">
               <a:rPr lang="en-CA" smtClean="0"/>
-              <a:t>2017-12-04</a:t>
+              <a:t>2017-12-06</a:t>
             </a:fld>
             <a:endParaRPr lang="en-CA"/>
           </a:p>
@@ -2439,7 +2440,7 @@
           <a:p>
             <a:fld id="{0EC1CE10-7A36-4A3B-849C-60992C6CD584}" type="datetimeFigureOut">
               <a:rPr lang="en-CA" smtClean="0"/>
-              <a:t>2017-12-04</a:t>
+              <a:t>2017-12-06</a:t>
             </a:fld>
             <a:endParaRPr lang="en-CA"/>
           </a:p>
@@ -2557,7 +2558,7 @@
           <a:p>
             <a:fld id="{0EC1CE10-7A36-4A3B-849C-60992C6CD584}" type="datetimeFigureOut">
               <a:rPr lang="en-CA" smtClean="0"/>
-              <a:t>2017-12-04</a:t>
+              <a:t>2017-12-06</a:t>
             </a:fld>
             <a:endParaRPr lang="en-CA"/>
           </a:p>
@@ -2652,7 +2653,7 @@
           <a:p>
             <a:fld id="{0EC1CE10-7A36-4A3B-849C-60992C6CD584}" type="datetimeFigureOut">
               <a:rPr lang="en-CA" smtClean="0"/>
-              <a:t>2017-12-04</a:t>
+              <a:t>2017-12-06</a:t>
             </a:fld>
             <a:endParaRPr lang="en-CA"/>
           </a:p>
@@ -2929,7 +2930,7 @@
           <a:p>
             <a:fld id="{0EC1CE10-7A36-4A3B-849C-60992C6CD584}" type="datetimeFigureOut">
               <a:rPr lang="en-CA" smtClean="0"/>
-              <a:t>2017-12-04</a:t>
+              <a:t>2017-12-06</a:t>
             </a:fld>
             <a:endParaRPr lang="en-CA"/>
           </a:p>
@@ -3186,7 +3187,7 @@
           <a:p>
             <a:fld id="{0EC1CE10-7A36-4A3B-849C-60992C6CD584}" type="datetimeFigureOut">
               <a:rPr lang="en-CA" smtClean="0"/>
-              <a:t>2017-12-04</a:t>
+              <a:t>2017-12-06</a:t>
             </a:fld>
             <a:endParaRPr lang="en-CA"/>
           </a:p>
@@ -3399,7 +3400,7 @@
           <a:p>
             <a:fld id="{0EC1CE10-7A36-4A3B-849C-60992C6CD584}" type="datetimeFigureOut">
               <a:rPr lang="en-CA" smtClean="0"/>
-              <a:t>2017-12-04</a:t>
+              <a:t>2017-12-06</a:t>
             </a:fld>
             <a:endParaRPr lang="en-CA"/>
           </a:p>
@@ -3951,27 +3952,14 @@
           <a:p>
             <a:r>
               <a:rPr lang="en-CA" sz="3600" dirty="0" smtClean="0"/>
-              <a:t>Slightly more advanced </a:t>
-            </a:r>
+              <a:t>Slightly more advanced (in the second half)</a:t>
+            </a:r>
+          </a:p>
+          <a:p>
+            <a:pPr lvl="1"/>
             <a:r>
               <a:rPr lang="en-CA" sz="3600" dirty="0" smtClean="0"/>
-              <a:t>(in the second half)</a:t>
-            </a:r>
-            <a:endParaRPr lang="en-CA" sz="3600" dirty="0" smtClean="0"/>
-          </a:p>
-          <a:p>
-            <a:pPr lvl="1"/>
-            <a:r>
-              <a:rPr lang="en-CA" sz="3600" dirty="0" smtClean="0"/>
-              <a:t>Collaborating </a:t>
-            </a:r>
-            <a:r>
-              <a:rPr lang="en-CA" sz="3600" dirty="0" smtClean="0"/>
-              <a:t>using local and remote </a:t>
-            </a:r>
-            <a:r>
-              <a:rPr lang="en-CA" sz="3600" dirty="0" smtClean="0"/>
-              <a:t>repositories</a:t>
+              <a:t>Collaborating using local and remote repositories</a:t>
             </a:r>
           </a:p>
           <a:p>
@@ -3984,7 +3972,6 @@
               <a:rPr lang="en-CA" sz="3600" dirty="0" smtClean="0"/>
               <a:t>branches</a:t>
             </a:r>
-            <a:endParaRPr lang="en-CA" sz="3600" dirty="0" smtClean="0"/>
           </a:p>
           <a:p>
             <a:pPr lvl="1"/>
@@ -3992,7 +3979,6 @@
               <a:rPr lang="en-CA" sz="3600" dirty="0" smtClean="0"/>
               <a:t>Other useful tricks </a:t>
             </a:r>
-            <a:endParaRPr lang="en-CA" sz="3600" dirty="0" smtClean="0"/>
           </a:p>
         </p:txBody>
       </p:sp>
@@ -4009,7 +3995,270 @@
   <p:timing>
     <p:tnLst>
       <p:par>
-        <p:cTn id="1" dur="indefinite" restart="never" nodeType="tmRoot"/>
+        <p:cTn id="1" dur="indefinite" restart="never" nodeType="tmRoot">
+          <p:childTnLst>
+            <p:seq concurrent="1" nextAc="seek">
+              <p:cTn id="2" dur="indefinite" nodeType="mainSeq">
+                <p:childTnLst>
+                  <p:par>
+                    <p:cTn id="3" fill="hold">
+                      <p:stCondLst>
+                        <p:cond delay="indefinite"/>
+                      </p:stCondLst>
+                      <p:childTnLst>
+                        <p:par>
+                          <p:cTn id="4" fill="hold">
+                            <p:stCondLst>
+                              <p:cond delay="0"/>
+                            </p:stCondLst>
+                            <p:childTnLst>
+                              <p:par>
+                                <p:cTn id="5" presetID="1" presetClass="entr" presetSubtype="0" fill="hold" nodeType="clickEffect">
+                                  <p:stCondLst>
+                                    <p:cond delay="0"/>
+                                  </p:stCondLst>
+                                  <p:childTnLst>
+                                    <p:set>
+                                      <p:cBhvr>
+                                        <p:cTn id="6" dur="1" fill="hold">
+                                          <p:stCondLst>
+                                            <p:cond delay="0"/>
+                                          </p:stCondLst>
+                                        </p:cTn>
+                                        <p:tgtEl>
+                                          <p:spTgt spid="3">
+                                            <p:txEl>
+                                              <p:pRg st="0" end="0"/>
+                                            </p:txEl>
+                                          </p:spTgt>
+                                        </p:tgtEl>
+                                        <p:attrNameLst>
+                                          <p:attrName>style.visibility</p:attrName>
+                                        </p:attrNameLst>
+                                      </p:cBhvr>
+                                      <p:to>
+                                        <p:strVal val="visible"/>
+                                      </p:to>
+                                    </p:set>
+                                  </p:childTnLst>
+                                </p:cTn>
+                              </p:par>
+                            </p:childTnLst>
+                          </p:cTn>
+                        </p:par>
+                      </p:childTnLst>
+                    </p:cTn>
+                  </p:par>
+                  <p:par>
+                    <p:cTn id="7" fill="hold">
+                      <p:stCondLst>
+                        <p:cond delay="indefinite"/>
+                      </p:stCondLst>
+                      <p:childTnLst>
+                        <p:par>
+                          <p:cTn id="8" fill="hold">
+                            <p:stCondLst>
+                              <p:cond delay="0"/>
+                            </p:stCondLst>
+                            <p:childTnLst>
+                              <p:par>
+                                <p:cTn id="9" presetID="1" presetClass="entr" presetSubtype="0" fill="hold" nodeType="clickEffect">
+                                  <p:stCondLst>
+                                    <p:cond delay="0"/>
+                                  </p:stCondLst>
+                                  <p:childTnLst>
+                                    <p:set>
+                                      <p:cBhvr>
+                                        <p:cTn id="10" dur="1" fill="hold">
+                                          <p:stCondLst>
+                                            <p:cond delay="0"/>
+                                          </p:stCondLst>
+                                        </p:cTn>
+                                        <p:tgtEl>
+                                          <p:spTgt spid="3">
+                                            <p:txEl>
+                                              <p:pRg st="1" end="1"/>
+                                            </p:txEl>
+                                          </p:spTgt>
+                                        </p:tgtEl>
+                                        <p:attrNameLst>
+                                          <p:attrName>style.visibility</p:attrName>
+                                        </p:attrNameLst>
+                                      </p:cBhvr>
+                                      <p:to>
+                                        <p:strVal val="visible"/>
+                                      </p:to>
+                                    </p:set>
+                                  </p:childTnLst>
+                                </p:cTn>
+                              </p:par>
+                            </p:childTnLst>
+                          </p:cTn>
+                        </p:par>
+                      </p:childTnLst>
+                    </p:cTn>
+                  </p:par>
+                  <p:par>
+                    <p:cTn id="11" fill="hold">
+                      <p:stCondLst>
+                        <p:cond delay="indefinite"/>
+                      </p:stCondLst>
+                      <p:childTnLst>
+                        <p:par>
+                          <p:cTn id="12" fill="hold">
+                            <p:stCondLst>
+                              <p:cond delay="0"/>
+                            </p:stCondLst>
+                            <p:childTnLst>
+                              <p:par>
+                                <p:cTn id="13" presetID="1" presetClass="entr" presetSubtype="0" fill="hold" nodeType="clickEffect">
+                                  <p:stCondLst>
+                                    <p:cond delay="0"/>
+                                  </p:stCondLst>
+                                  <p:childTnLst>
+                                    <p:set>
+                                      <p:cBhvr>
+                                        <p:cTn id="14" dur="1" fill="hold">
+                                          <p:stCondLst>
+                                            <p:cond delay="0"/>
+                                          </p:stCondLst>
+                                        </p:cTn>
+                                        <p:tgtEl>
+                                          <p:spTgt spid="3">
+                                            <p:txEl>
+                                              <p:pRg st="2" end="2"/>
+                                            </p:txEl>
+                                          </p:spTgt>
+                                        </p:tgtEl>
+                                        <p:attrNameLst>
+                                          <p:attrName>style.visibility</p:attrName>
+                                        </p:attrNameLst>
+                                      </p:cBhvr>
+                                      <p:to>
+                                        <p:strVal val="visible"/>
+                                      </p:to>
+                                    </p:set>
+                                  </p:childTnLst>
+                                </p:cTn>
+                              </p:par>
+                              <p:par>
+                                <p:cTn id="15" presetID="1" presetClass="entr" presetSubtype="0" fill="hold" nodeType="withEffect">
+                                  <p:stCondLst>
+                                    <p:cond delay="0"/>
+                                  </p:stCondLst>
+                                  <p:childTnLst>
+                                    <p:set>
+                                      <p:cBhvr>
+                                        <p:cTn id="16" dur="1" fill="hold">
+                                          <p:stCondLst>
+                                            <p:cond delay="0"/>
+                                          </p:stCondLst>
+                                        </p:cTn>
+                                        <p:tgtEl>
+                                          <p:spTgt spid="3">
+                                            <p:txEl>
+                                              <p:pRg st="3" end="3"/>
+                                            </p:txEl>
+                                          </p:spTgt>
+                                        </p:tgtEl>
+                                        <p:attrNameLst>
+                                          <p:attrName>style.visibility</p:attrName>
+                                        </p:attrNameLst>
+                                      </p:cBhvr>
+                                      <p:to>
+                                        <p:strVal val="visible"/>
+                                      </p:to>
+                                    </p:set>
+                                  </p:childTnLst>
+                                </p:cTn>
+                              </p:par>
+                              <p:par>
+                                <p:cTn id="17" presetID="1" presetClass="entr" presetSubtype="0" fill="hold" nodeType="withEffect">
+                                  <p:stCondLst>
+                                    <p:cond delay="0"/>
+                                  </p:stCondLst>
+                                  <p:childTnLst>
+                                    <p:set>
+                                      <p:cBhvr>
+                                        <p:cTn id="18" dur="1" fill="hold">
+                                          <p:stCondLst>
+                                            <p:cond delay="0"/>
+                                          </p:stCondLst>
+                                        </p:cTn>
+                                        <p:tgtEl>
+                                          <p:spTgt spid="3">
+                                            <p:txEl>
+                                              <p:pRg st="4" end="4"/>
+                                            </p:txEl>
+                                          </p:spTgt>
+                                        </p:tgtEl>
+                                        <p:attrNameLst>
+                                          <p:attrName>style.visibility</p:attrName>
+                                        </p:attrNameLst>
+                                      </p:cBhvr>
+                                      <p:to>
+                                        <p:strVal val="visible"/>
+                                      </p:to>
+                                    </p:set>
+                                  </p:childTnLst>
+                                </p:cTn>
+                              </p:par>
+                              <p:par>
+                                <p:cTn id="19" presetID="1" presetClass="entr" presetSubtype="0" fill="hold" nodeType="withEffect">
+                                  <p:stCondLst>
+                                    <p:cond delay="0"/>
+                                  </p:stCondLst>
+                                  <p:childTnLst>
+                                    <p:set>
+                                      <p:cBhvr>
+                                        <p:cTn id="20" dur="1" fill="hold">
+                                          <p:stCondLst>
+                                            <p:cond delay="0"/>
+                                          </p:stCondLst>
+                                        </p:cTn>
+                                        <p:tgtEl>
+                                          <p:spTgt spid="3">
+                                            <p:txEl>
+                                              <p:pRg st="5" end="5"/>
+                                            </p:txEl>
+                                          </p:spTgt>
+                                        </p:tgtEl>
+                                        <p:attrNameLst>
+                                          <p:attrName>style.visibility</p:attrName>
+                                        </p:attrNameLst>
+                                      </p:cBhvr>
+                                      <p:to>
+                                        <p:strVal val="visible"/>
+                                      </p:to>
+                                    </p:set>
+                                  </p:childTnLst>
+                                </p:cTn>
+                              </p:par>
+                            </p:childTnLst>
+                          </p:cTn>
+                        </p:par>
+                      </p:childTnLst>
+                    </p:cTn>
+                  </p:par>
+                </p:childTnLst>
+              </p:cTn>
+              <p:prevCondLst>
+                <p:cond evt="onPrev" delay="0">
+                  <p:tgtEl>
+                    <p:sldTgt/>
+                  </p:tgtEl>
+                </p:cond>
+              </p:prevCondLst>
+              <p:nextCondLst>
+                <p:cond evt="onNext" delay="0">
+                  <p:tgtEl>
+                    <p:sldTgt/>
+                  </p:tgtEl>
+                </p:cond>
+              </p:nextCondLst>
+            </p:seq>
+          </p:childTnLst>
+        </p:cTn>
       </p:par>
     </p:tnLst>
   </p:timing>
@@ -4078,7 +4327,15 @@
             </a:pPr>
             <a:r>
               <a:rPr lang="en-CA" dirty="0" smtClean="0"/>
-              <a:t>Open up a command terminal and type in the following two lines (using your own name and email):</a:t>
+              <a:t>Open up </a:t>
+            </a:r>
+            <a:r>
+              <a:rPr lang="en-CA" dirty="0" smtClean="0"/>
+              <a:t>a command line terminal (git bash on Windows, terminal on Mac) and </a:t>
+            </a:r>
+            <a:r>
+              <a:rPr lang="en-CA" dirty="0" smtClean="0"/>
+              <a:t>type in the following two lines (using your own name and email):</a:t>
             </a:r>
           </a:p>
           <a:p>
@@ -7572,7 +7829,6 @@
               <a:rPr lang="en-CA" sz="4400" dirty="0" smtClean="0"/>
               <a:t>Commit 1: </a:t>
             </a:r>
-            <a:endParaRPr lang="en-CA" sz="4400" dirty="0" smtClean="0"/>
           </a:p>
           <a:p>
             <a:r>
@@ -8824,15 +9080,7 @@
             </a:r>
             <a:r>
               <a:rPr lang="en-CA" dirty="0" smtClean="0"/>
-              <a:t>(</a:t>
-            </a:r>
-            <a:r>
-              <a:rPr lang="en-CA" dirty="0" smtClean="0"/>
-              <a:t>15 </a:t>
-            </a:r>
-            <a:r>
-              <a:rPr lang="en-CA" dirty="0" smtClean="0"/>
-              <a:t>minutes)</a:t>
+              <a:t>(15 minutes)</a:t>
             </a:r>
             <a:endParaRPr lang="en-CA" dirty="0"/>
           </a:p>
@@ -13039,6 +13287,223 @@
 </file>
 
 <file path=ppt/slides/slide29.xml><?xml version="1.0" encoding="utf-8"?>
+<p:sld xmlns:a="http://schemas.openxmlformats.org/drawingml/2006/main" xmlns:r="http://schemas.openxmlformats.org/officeDocument/2006/relationships" xmlns:p="http://schemas.openxmlformats.org/presentationml/2006/main">
+  <p:cSld>
+    <p:spTree>
+      <p:nvGrpSpPr>
+        <p:cNvPr id="1" name=""/>
+        <p:cNvGrpSpPr/>
+        <p:nvPr/>
+      </p:nvGrpSpPr>
+      <p:grpSpPr>
+        <a:xfrm>
+          <a:off x="0" y="0"/>
+          <a:ext cx="0" cy="0"/>
+          <a:chOff x="0" y="0"/>
+          <a:chExt cx="0" cy="0"/>
+        </a:xfrm>
+      </p:grpSpPr>
+      <p:sp>
+        <p:nvSpPr>
+          <p:cNvPr id="2" name="Title 1"/>
+          <p:cNvSpPr>
+            <a:spLocks noGrp="1"/>
+          </p:cNvSpPr>
+          <p:nvPr>
+            <p:ph type="title"/>
+          </p:nvPr>
+        </p:nvSpPr>
+        <p:spPr>
+          <a:xfrm>
+            <a:off x="1159329" y="1811791"/>
+            <a:ext cx="9873342" cy="3234418"/>
+          </a:xfrm>
+        </p:spPr>
+        <p:txBody>
+          <a:bodyPr>
+            <a:noAutofit/>
+          </a:bodyPr>
+          <a:lstStyle/>
+          <a:p>
+            <a:r>
+              <a:rPr lang="en-CA" sz="5400" dirty="0" smtClean="0"/>
+              <a:t>A quick demo of working with a remote repository</a:t>
+            </a:r>
+            <a:endParaRPr lang="en-CA" sz="5400" dirty="0"/>
+          </a:p>
+        </p:txBody>
+      </p:sp>
+    </p:spTree>
+    <p:extLst>
+      <p:ext uri="{BB962C8B-B14F-4D97-AF65-F5344CB8AC3E}">
+        <p14:creationId xmlns:p14="http://schemas.microsoft.com/office/powerpoint/2010/main" val="2473864016"/>
+      </p:ext>
+    </p:extLst>
+  </p:cSld>
+  <p:clrMapOvr>
+    <a:masterClrMapping/>
+  </p:clrMapOvr>
+  <p:timing>
+    <p:tnLst>
+      <p:par>
+        <p:cTn id="1" dur="indefinite" restart="never" nodeType="tmRoot"/>
+      </p:par>
+    </p:tnLst>
+  </p:timing>
+</p:sld>
+</file>
+
+<file path=ppt/slides/slide3.xml><?xml version="1.0" encoding="utf-8"?>
+<p:sld xmlns:a="http://schemas.openxmlformats.org/drawingml/2006/main" xmlns:r="http://schemas.openxmlformats.org/officeDocument/2006/relationships" xmlns:p="http://schemas.openxmlformats.org/presentationml/2006/main">
+  <p:cSld>
+    <p:spTree>
+      <p:nvGrpSpPr>
+        <p:cNvPr id="1" name=""/>
+        <p:cNvGrpSpPr/>
+        <p:nvPr/>
+      </p:nvGrpSpPr>
+      <p:grpSpPr>
+        <a:xfrm>
+          <a:off x="0" y="0"/>
+          <a:ext cx="0" cy="0"/>
+          <a:chOff x="0" y="0"/>
+          <a:chExt cx="0" cy="0"/>
+        </a:xfrm>
+      </p:grpSpPr>
+      <p:sp>
+        <p:nvSpPr>
+          <p:cNvPr id="2" name="Title 1"/>
+          <p:cNvSpPr>
+            <a:spLocks noGrp="1"/>
+          </p:cNvSpPr>
+          <p:nvPr>
+            <p:ph type="title"/>
+          </p:nvPr>
+        </p:nvSpPr>
+        <p:spPr/>
+        <p:txBody>
+          <a:bodyPr/>
+          <a:lstStyle/>
+          <a:p>
+            <a:r>
+              <a:rPr lang="en-CA" dirty="0" smtClean="0"/>
+              <a:t>The lab book has many purposes:</a:t>
+            </a:r>
+            <a:endParaRPr lang="en-CA" dirty="0"/>
+          </a:p>
+        </p:txBody>
+      </p:sp>
+      <p:sp>
+        <p:nvSpPr>
+          <p:cNvPr id="3" name="Content Placeholder 2"/>
+          <p:cNvSpPr>
+            <a:spLocks noGrp="1"/>
+          </p:cNvSpPr>
+          <p:nvPr>
+            <p:ph idx="1"/>
+          </p:nvPr>
+        </p:nvSpPr>
+        <p:spPr>
+          <a:xfrm>
+            <a:off x="7045817" y="1447242"/>
+            <a:ext cx="5146183" cy="5108104"/>
+          </a:xfrm>
+        </p:spPr>
+        <p:txBody>
+          <a:bodyPr>
+            <a:normAutofit fontScale="92500"/>
+          </a:bodyPr>
+          <a:lstStyle/>
+          <a:p>
+            <a:r>
+              <a:rPr lang="en-CA" dirty="0" smtClean="0"/>
+              <a:t>Reminds you of what you’ve done</a:t>
+            </a:r>
+          </a:p>
+          <a:p>
+            <a:r>
+              <a:rPr lang="en-CA" dirty="0" smtClean="0"/>
+              <a:t>Lets you go back to change something that went wrong</a:t>
+            </a:r>
+          </a:p>
+          <a:p>
+            <a:r>
+              <a:rPr lang="en-CA" dirty="0" smtClean="0"/>
+              <a:t>Lets other people reproduce your work or pick up where you left off</a:t>
+            </a:r>
+          </a:p>
+          <a:p>
+            <a:r>
+              <a:rPr lang="en-CA" dirty="0" smtClean="0"/>
+              <a:t>Serves as proof that the work was done</a:t>
+            </a:r>
+          </a:p>
+          <a:p>
+            <a:endParaRPr lang="en-CA" dirty="0"/>
+          </a:p>
+          <a:p>
+            <a:pPr marL="0" indent="0">
+              <a:buNone/>
+            </a:pPr>
+            <a:r>
+              <a:rPr lang="en-CA" sz="3200" b="1" dirty="0" smtClean="0"/>
+              <a:t>Why do many people stop when it comes to writing code?</a:t>
+            </a:r>
+            <a:endParaRPr lang="en-CA" sz="3200" b="1" dirty="0"/>
+          </a:p>
+        </p:txBody>
+      </p:sp>
+      <p:pic>
+        <p:nvPicPr>
+          <p:cNvPr id="4" name="Picture 3"/>
+          <p:cNvPicPr>
+            <a:picLocks noChangeAspect="1"/>
+          </p:cNvPicPr>
+          <p:nvPr/>
+        </p:nvPicPr>
+        <p:blipFill>
+          <a:blip r:embed="rId2">
+            <a:extLst>
+              <a:ext uri="{28A0092B-C50C-407E-A947-70E740481C1C}">
+                <a14:useLocalDpi xmlns:a14="http://schemas.microsoft.com/office/drawing/2010/main" val="0"/>
+              </a:ext>
+            </a:extLst>
+          </a:blip>
+          <a:stretch>
+            <a:fillRect/>
+          </a:stretch>
+        </p:blipFill>
+        <p:spPr>
+          <a:xfrm>
+            <a:off x="10305" y="1447242"/>
+            <a:ext cx="6815412" cy="5108104"/>
+          </a:xfrm>
+          <a:prstGeom prst="rect">
+            <a:avLst/>
+          </a:prstGeom>
+        </p:spPr>
+      </p:pic>
+    </p:spTree>
+    <p:extLst>
+      <p:ext uri="{BB962C8B-B14F-4D97-AF65-F5344CB8AC3E}">
+        <p14:creationId xmlns:p14="http://schemas.microsoft.com/office/powerpoint/2010/main" val="2669413875"/>
+      </p:ext>
+    </p:extLst>
+  </p:cSld>
+  <p:clrMapOvr>
+    <a:masterClrMapping/>
+  </p:clrMapOvr>
+  <p:timing>
+    <p:tnLst>
+      <p:par>
+        <p:cTn id="1" dur="indefinite" restart="never" nodeType="tmRoot"/>
+      </p:par>
+    </p:tnLst>
+  </p:timing>
+</p:sld>
+</file>
+
+<file path=ppt/slides/slide30.xml><?xml version="1.0" encoding="utf-8"?>
 <p:sld xmlns:a="http://schemas.openxmlformats.org/drawingml/2006/main" xmlns:r="http://schemas.openxmlformats.org/officeDocument/2006/relationships" xmlns:p="http://schemas.openxmlformats.org/presentationml/2006/main">
   <p:cSld>
     <p:spTree>
@@ -14454,157 +14919,7 @@
 </p:sld>
 </file>
 
-<file path=ppt/slides/slide3.xml><?xml version="1.0" encoding="utf-8"?>
-<p:sld xmlns:a="http://schemas.openxmlformats.org/drawingml/2006/main" xmlns:r="http://schemas.openxmlformats.org/officeDocument/2006/relationships" xmlns:p="http://schemas.openxmlformats.org/presentationml/2006/main">
-  <p:cSld>
-    <p:spTree>
-      <p:nvGrpSpPr>
-        <p:cNvPr id="1" name=""/>
-        <p:cNvGrpSpPr/>
-        <p:nvPr/>
-      </p:nvGrpSpPr>
-      <p:grpSpPr>
-        <a:xfrm>
-          <a:off x="0" y="0"/>
-          <a:ext cx="0" cy="0"/>
-          <a:chOff x="0" y="0"/>
-          <a:chExt cx="0" cy="0"/>
-        </a:xfrm>
-      </p:grpSpPr>
-      <p:sp>
-        <p:nvSpPr>
-          <p:cNvPr id="2" name="Title 1"/>
-          <p:cNvSpPr>
-            <a:spLocks noGrp="1"/>
-          </p:cNvSpPr>
-          <p:nvPr>
-            <p:ph type="title"/>
-          </p:nvPr>
-        </p:nvSpPr>
-        <p:spPr/>
-        <p:txBody>
-          <a:bodyPr/>
-          <a:lstStyle/>
-          <a:p>
-            <a:r>
-              <a:rPr lang="en-CA" dirty="0" smtClean="0"/>
-              <a:t>The lab book has many purposes:</a:t>
-            </a:r>
-            <a:endParaRPr lang="en-CA" dirty="0"/>
-          </a:p>
-        </p:txBody>
-      </p:sp>
-      <p:sp>
-        <p:nvSpPr>
-          <p:cNvPr id="3" name="Content Placeholder 2"/>
-          <p:cNvSpPr>
-            <a:spLocks noGrp="1"/>
-          </p:cNvSpPr>
-          <p:nvPr>
-            <p:ph idx="1"/>
-          </p:nvPr>
-        </p:nvSpPr>
-        <p:spPr>
-          <a:xfrm>
-            <a:off x="7045817" y="1447242"/>
-            <a:ext cx="5146183" cy="5108104"/>
-          </a:xfrm>
-        </p:spPr>
-        <p:txBody>
-          <a:bodyPr>
-            <a:normAutofit fontScale="92500"/>
-          </a:bodyPr>
-          <a:lstStyle/>
-          <a:p>
-            <a:r>
-              <a:rPr lang="en-CA" dirty="0" smtClean="0"/>
-              <a:t>Reminds you of what you’ve done</a:t>
-            </a:r>
-          </a:p>
-          <a:p>
-            <a:r>
-              <a:rPr lang="en-CA" dirty="0" smtClean="0"/>
-              <a:t>Lets you go back to change something that went wrong</a:t>
-            </a:r>
-          </a:p>
-          <a:p>
-            <a:r>
-              <a:rPr lang="en-CA" dirty="0" smtClean="0"/>
-              <a:t>Lets other people reproduce your work or pick up where you left off</a:t>
-            </a:r>
-          </a:p>
-          <a:p>
-            <a:r>
-              <a:rPr lang="en-CA" dirty="0" smtClean="0"/>
-              <a:t>Serves as proof that the work was done</a:t>
-            </a:r>
-          </a:p>
-          <a:p>
-            <a:endParaRPr lang="en-CA" dirty="0"/>
-          </a:p>
-          <a:p>
-            <a:pPr marL="0" indent="0">
-              <a:buNone/>
-            </a:pPr>
-            <a:r>
-              <a:rPr lang="en-CA" sz="3200" b="1" dirty="0" smtClean="0"/>
-              <a:t>Why do many people stop when it comes to writing code?</a:t>
-            </a:r>
-            <a:endParaRPr lang="en-CA" sz="3200" b="1" dirty="0"/>
-          </a:p>
-        </p:txBody>
-      </p:sp>
-      <p:pic>
-        <p:nvPicPr>
-          <p:cNvPr id="4" name="Picture 3"/>
-          <p:cNvPicPr>
-            <a:picLocks noChangeAspect="1"/>
-          </p:cNvPicPr>
-          <p:nvPr/>
-        </p:nvPicPr>
-        <p:blipFill>
-          <a:blip r:embed="rId2">
-            <a:extLst>
-              <a:ext uri="{28A0092B-C50C-407E-A947-70E740481C1C}">
-                <a14:useLocalDpi xmlns:a14="http://schemas.microsoft.com/office/drawing/2010/main" val="0"/>
-              </a:ext>
-            </a:extLst>
-          </a:blip>
-          <a:stretch>
-            <a:fillRect/>
-          </a:stretch>
-        </p:blipFill>
-        <p:spPr>
-          <a:xfrm>
-            <a:off x="10305" y="1447242"/>
-            <a:ext cx="6815412" cy="5108104"/>
-          </a:xfrm>
-          <a:prstGeom prst="rect">
-            <a:avLst/>
-          </a:prstGeom>
-        </p:spPr>
-      </p:pic>
-    </p:spTree>
-    <p:extLst>
-      <p:ext uri="{BB962C8B-B14F-4D97-AF65-F5344CB8AC3E}">
-        <p14:creationId xmlns:p14="http://schemas.microsoft.com/office/powerpoint/2010/main" val="2669413875"/>
-      </p:ext>
-    </p:extLst>
-  </p:cSld>
-  <p:clrMapOvr>
-    <a:masterClrMapping/>
-  </p:clrMapOvr>
-  <p:timing>
-    <p:tnLst>
-      <p:par>
-        <p:cTn id="1" dur="indefinite" restart="never" nodeType="tmRoot"/>
-      </p:par>
-    </p:tnLst>
-  </p:timing>
-</p:sld>
-</file>
-
-<file path=ppt/slides/slide30.xml><?xml version="1.0" encoding="utf-8"?>
+<file path=ppt/slides/slide31.xml><?xml version="1.0" encoding="utf-8"?>
 <p:sld xmlns:a="http://schemas.openxmlformats.org/drawingml/2006/main" xmlns:r="http://schemas.openxmlformats.org/officeDocument/2006/relationships" xmlns:p="http://schemas.openxmlformats.org/presentationml/2006/main">
   <p:cSld>
     <p:spTree>
@@ -14693,7 +15008,7 @@
 </p:sld>
 </file>
 
-<file path=ppt/slides/slide31.xml><?xml version="1.0" encoding="utf-8"?>
+<file path=ppt/slides/slide32.xml><?xml version="1.0" encoding="utf-8"?>
 <p:sld xmlns:a="http://schemas.openxmlformats.org/drawingml/2006/main" xmlns:r="http://schemas.openxmlformats.org/officeDocument/2006/relationships" xmlns:p="http://schemas.openxmlformats.org/presentationml/2006/main">
   <p:cSld>
     <p:spTree>
@@ -14783,7 +15098,7 @@
 </p:sld>
 </file>
 
-<file path=ppt/slides/slide32.xml><?xml version="1.0" encoding="utf-8"?>
+<file path=ppt/slides/slide33.xml><?xml version="1.0" encoding="utf-8"?>
 <p:sld xmlns:a="http://schemas.openxmlformats.org/drawingml/2006/main" xmlns:r="http://schemas.openxmlformats.org/officeDocument/2006/relationships" xmlns:p="http://schemas.openxmlformats.org/presentationml/2006/main">
   <p:cSld>
     <p:spTree>
@@ -14923,7 +15238,7 @@
 </p:sld>
 </file>
 
-<file path=ppt/slides/slide33.xml><?xml version="1.0" encoding="utf-8"?>
+<file path=ppt/slides/slide34.xml><?xml version="1.0" encoding="utf-8"?>
 <p:sld xmlns:a="http://schemas.openxmlformats.org/drawingml/2006/main" xmlns:r="http://schemas.openxmlformats.org/officeDocument/2006/relationships" xmlns:p="http://schemas.openxmlformats.org/presentationml/2006/main">
   <p:cSld>
     <p:spTree>
@@ -15090,7 +15405,7 @@
 </p:sld>
 </file>
 
-<file path=ppt/slides/slide34.xml><?xml version="1.0" encoding="utf-8"?>
+<file path=ppt/slides/slide35.xml><?xml version="1.0" encoding="utf-8"?>
 <p:sld xmlns:a="http://schemas.openxmlformats.org/drawingml/2006/main" xmlns:r="http://schemas.openxmlformats.org/officeDocument/2006/relationships" xmlns:p="http://schemas.openxmlformats.org/presentationml/2006/main">
   <p:cSld>
     <p:spTree>
@@ -15231,7 +15546,7 @@
 </p:sld>
 </file>
 
-<file path=ppt/slides/slide35.xml><?xml version="1.0" encoding="utf-8"?>
+<file path=ppt/slides/slide36.xml><?xml version="1.0" encoding="utf-8"?>
 <p:sld xmlns:a="http://schemas.openxmlformats.org/drawingml/2006/main" xmlns:r="http://schemas.openxmlformats.org/officeDocument/2006/relationships" xmlns:p="http://schemas.openxmlformats.org/presentationml/2006/main">
   <p:cSld>
     <p:spTree>
@@ -15516,7 +15831,7 @@
 </p:sld>
 </file>
 
-<file path=ppt/slides/slide36.xml><?xml version="1.0" encoding="utf-8"?>
+<file path=ppt/slides/slide37.xml><?xml version="1.0" encoding="utf-8"?>
 <p:sld xmlns:a="http://schemas.openxmlformats.org/drawingml/2006/main" xmlns:r="http://schemas.openxmlformats.org/officeDocument/2006/relationships" xmlns:p="http://schemas.openxmlformats.org/presentationml/2006/main">
   <p:cSld>
     <p:spTree>
@@ -16843,13 +17158,8 @@
           <a:p>
             <a:r>
               <a:rPr lang="en-CA" sz="3600" dirty="0" smtClean="0"/>
-              <a:t>Can put things on GitHub (more about this </a:t>
-            </a:r>
-            <a:r>
-              <a:rPr lang="en-CA" sz="3600" dirty="0" smtClean="0"/>
-              <a:t>in the second half)</a:t>
-            </a:r>
-            <a:endParaRPr lang="en-CA" sz="3600" dirty="0" smtClean="0"/>
+              <a:t>Can put things on GitHub (more about this in the second half)</a:t>
+            </a:r>
           </a:p>
         </p:txBody>
       </p:sp>
@@ -17552,7 +17862,7 @@
   <a:extraClrSchemeLst/>
   <a:extLst>
     <a:ext uri="{05A4C25C-085E-4340-85A3-A5531E510DB2}">
-      <thm15:themeFamily xmlns="" xmlns:thm15="http://schemas.microsoft.com/office/thememl/2012/main" name="Office Theme" id="{62F939B6-93AF-4DB8-9C6B-D6C7DFDC589F}" vid="{4F46216B-77A9-411A-B9D3-5023FCB70208}"/>
+      <thm15:themeFamily xmlns:thm15="http://schemas.microsoft.com/office/thememl/2012/main" xmlns="" name="Office Theme" id="{62F939B6-93AF-4DB8-9C6B-D6C7DFDC589F}" vid="{4F46216B-77A9-411A-B9D3-5023FCB70208}"/>
     </a:ext>
   </a:extLst>
 </a:theme>

</xml_diff>

<commit_message>
updated commands for the first git workshop including a fix for Mac users
</commit_message>
<xml_diff>
--- a/dfo_git_workshop/Using version control.pptx
+++ b/dfo_git_workshop/Using version control.pptx
@@ -5,7 +5,7 @@
     <p:sldMasterId id="2147483684" r:id="rId1"/>
   </p:sldMasterIdLst>
   <p:notesMasterIdLst>
-    <p:notesMasterId r:id="rId39"/>
+    <p:notesMasterId r:id="rId38"/>
   </p:notesMasterIdLst>
   <p:sldIdLst>
     <p:sldId id="256" r:id="rId2"/>
@@ -36,15 +36,14 @@
     <p:sldId id="287" r:id="rId27"/>
     <p:sldId id="296" r:id="rId28"/>
     <p:sldId id="297" r:id="rId29"/>
-    <p:sldId id="301" r:id="rId30"/>
-    <p:sldId id="294" r:id="rId31"/>
-    <p:sldId id="288" r:id="rId32"/>
-    <p:sldId id="299" r:id="rId33"/>
-    <p:sldId id="289" r:id="rId34"/>
-    <p:sldId id="290" r:id="rId35"/>
-    <p:sldId id="298" r:id="rId36"/>
-    <p:sldId id="268" r:id="rId37"/>
-    <p:sldId id="282" r:id="rId38"/>
+    <p:sldId id="294" r:id="rId30"/>
+    <p:sldId id="288" r:id="rId31"/>
+    <p:sldId id="299" r:id="rId32"/>
+    <p:sldId id="289" r:id="rId33"/>
+    <p:sldId id="290" r:id="rId34"/>
+    <p:sldId id="298" r:id="rId35"/>
+    <p:sldId id="268" r:id="rId36"/>
+    <p:sldId id="282" r:id="rId37"/>
   </p:sldIdLst>
   <p:sldSz cx="12192000" cy="6858000"/>
   <p:notesSz cx="6858000" cy="9144000"/>
@@ -145,7 +144,7 @@
   </p:defaultTextStyle>
   <p:extLst>
     <p:ext uri="{EFAFB233-063F-42B5-8137-9DF3F51BA10A}">
-      <p15:sldGuideLst xmlns:p15="http://schemas.microsoft.com/office/powerpoint/2012/main" xmlns=""/>
+      <p15:sldGuideLst xmlns="" xmlns:p15="http://schemas.microsoft.com/office/powerpoint/2012/main"/>
     </p:ext>
   </p:extLst>
 </p:presentation>
@@ -233,7 +232,7 @@
           <a:p>
             <a:fld id="{419EAFB0-D06D-49D8-BD59-4B489921E9EB}" type="datetimeFigureOut">
               <a:rPr lang="en-CA" smtClean="0"/>
-              <a:t>2017-12-06</a:t>
+              <a:t>2017-12-04</a:t>
             </a:fld>
             <a:endParaRPr lang="en-CA"/>
           </a:p>
@@ -547,210 +546,6 @@
           <a:p>
             <a:r>
               <a:rPr lang="en-CA" dirty="0" smtClean="0"/>
-              <a:t>General</a:t>
-            </a:r>
-            <a:r>
-              <a:rPr lang="en-CA" baseline="0" dirty="0" smtClean="0"/>
-              <a:t> outline: </a:t>
-            </a:r>
-          </a:p>
-          <a:p>
-            <a:pPr marL="228600" indent="-228600">
-              <a:buFont typeface="+mj-lt"/>
-              <a:buAutoNum type="arabicPeriod"/>
-            </a:pPr>
-            <a:r>
-              <a:rPr lang="en-CA" baseline="0" dirty="0" smtClean="0"/>
-              <a:t>Spend 10 minutes on intro (up to slide 10)</a:t>
-            </a:r>
-          </a:p>
-          <a:p>
-            <a:pPr marL="228600" indent="-228600">
-              <a:buFont typeface="+mj-lt"/>
-              <a:buAutoNum type="arabicPeriod"/>
-            </a:pPr>
-            <a:r>
-              <a:rPr lang="en-CA" baseline="0" dirty="0" smtClean="0"/>
-              <a:t>Spend 15 minutes on slides on setting up git and </a:t>
-            </a:r>
-            <a:r>
-              <a:rPr lang="en-CA" baseline="0" dirty="0" err="1" smtClean="0"/>
-              <a:t>commiting</a:t>
-            </a:r>
-            <a:endParaRPr lang="en-CA" baseline="0" dirty="0" smtClean="0"/>
-          </a:p>
-          <a:p>
-            <a:pPr marL="228600" indent="-228600">
-              <a:buFont typeface="+mj-lt"/>
-              <a:buAutoNum type="arabicPeriod"/>
-            </a:pPr>
-            <a:r>
-              <a:rPr lang="en-CA" baseline="0" dirty="0" smtClean="0"/>
-              <a:t>Spend 20 minutes going through the script</a:t>
-            </a:r>
-          </a:p>
-          <a:p>
-            <a:pPr marL="228600" indent="-228600">
-              <a:buFont typeface="+mj-lt"/>
-              <a:buAutoNum type="arabicPeriod"/>
-            </a:pPr>
-            <a:r>
-              <a:rPr lang="en-CA" baseline="0" dirty="0" smtClean="0"/>
-              <a:t>Spend 10 minutes on the first exercise</a:t>
-            </a:r>
-          </a:p>
-          <a:p>
-            <a:pPr marL="228600" indent="-228600">
-              <a:buFont typeface="+mj-lt"/>
-              <a:buAutoNum type="arabicPeriod"/>
-            </a:pPr>
-            <a:r>
-              <a:rPr lang="en-CA" baseline="0" dirty="0" smtClean="0"/>
-              <a:t>Spend 5-10 minutes discussing GUIs</a:t>
-            </a:r>
-          </a:p>
-          <a:p>
-            <a:pPr marL="228600" indent="-228600">
-              <a:buFont typeface="+mj-lt"/>
-              <a:buAutoNum type="arabicPeriod"/>
-            </a:pPr>
-            <a:endParaRPr lang="en-CA" baseline="0" dirty="0" smtClean="0"/>
-          </a:p>
-          <a:p>
-            <a:pPr marL="228600" indent="-228600">
-              <a:buFont typeface="+mj-lt"/>
-              <a:buAutoNum type="arabicPeriod"/>
-            </a:pPr>
-            <a:r>
-              <a:rPr lang="en-CA" baseline="0" dirty="0" smtClean="0"/>
-              <a:t>BREAK + 2</a:t>
-            </a:r>
-            <a:r>
-              <a:rPr lang="en-CA" baseline="30000" dirty="0" smtClean="0"/>
-              <a:t>nd</a:t>
-            </a:r>
-            <a:r>
-              <a:rPr lang="en-CA" baseline="0" dirty="0" smtClean="0"/>
-              <a:t> exercise (15 minutes)</a:t>
-            </a:r>
-          </a:p>
-          <a:p>
-            <a:pPr marL="228600" indent="-228600">
-              <a:buFont typeface="+mj-lt"/>
-              <a:buAutoNum type="arabicPeriod"/>
-            </a:pPr>
-            <a:r>
-              <a:rPr lang="en-CA" baseline="0" dirty="0" smtClean="0"/>
-              <a:t>Spend 20 minutes discussing remote repositories</a:t>
-            </a:r>
-          </a:p>
-          <a:p>
-            <a:pPr marL="228600" indent="-228600">
-              <a:buFont typeface="+mj-lt"/>
-              <a:buAutoNum type="arabicPeriod"/>
-            </a:pPr>
-            <a:r>
-              <a:rPr lang="en-CA" baseline="0" dirty="0" smtClean="0"/>
-              <a:t>Spend 15 minutes discussing branches </a:t>
-            </a:r>
-          </a:p>
-          <a:p>
-            <a:pPr marL="228600" indent="-228600">
-              <a:buFont typeface="+mj-lt"/>
-              <a:buAutoNum type="arabicPeriod"/>
-            </a:pPr>
-            <a:r>
-              <a:rPr lang="en-CA" baseline="0" dirty="0" smtClean="0"/>
-              <a:t>Spend 10 minutes discussing other features and resources</a:t>
-            </a:r>
-          </a:p>
-          <a:p>
-            <a:endParaRPr lang="en-CA" dirty="0"/>
-          </a:p>
-        </p:txBody>
-      </p:sp>
-      <p:sp>
-        <p:nvSpPr>
-          <p:cNvPr id="4" name="Slide Number Placeholder 3"/>
-          <p:cNvSpPr>
-            <a:spLocks noGrp="1"/>
-          </p:cNvSpPr>
-          <p:nvPr>
-            <p:ph type="sldNum" sz="quarter" idx="10"/>
-          </p:nvPr>
-        </p:nvSpPr>
-        <p:spPr/>
-        <p:txBody>
-          <a:bodyPr/>
-          <a:lstStyle/>
-          <a:p>
-            <a:fld id="{4615CC66-24E0-460E-92D2-4D1D8C4E3411}" type="slidenum">
-              <a:rPr lang="en-CA" smtClean="0"/>
-              <a:t>1</a:t>
-            </a:fld>
-            <a:endParaRPr lang="en-CA"/>
-          </a:p>
-        </p:txBody>
-      </p:sp>
-    </p:spTree>
-    <p:extLst>
-      <p:ext uri="{BB962C8B-B14F-4D97-AF65-F5344CB8AC3E}">
-        <p14:creationId xmlns:p14="http://schemas.microsoft.com/office/powerpoint/2010/main" val="2727429158"/>
-      </p:ext>
-    </p:extLst>
-  </p:cSld>
-  <p:clrMapOvr>
-    <a:masterClrMapping/>
-  </p:clrMapOvr>
-</p:notes>
-</file>
-
-<file path=ppt/notesSlides/notesSlide2.xml><?xml version="1.0" encoding="utf-8"?>
-<p:notes xmlns:a="http://schemas.openxmlformats.org/drawingml/2006/main" xmlns:r="http://schemas.openxmlformats.org/officeDocument/2006/relationships" xmlns:p="http://schemas.openxmlformats.org/presentationml/2006/main">
-  <p:cSld>
-    <p:spTree>
-      <p:nvGrpSpPr>
-        <p:cNvPr id="1" name=""/>
-        <p:cNvGrpSpPr/>
-        <p:nvPr/>
-      </p:nvGrpSpPr>
-      <p:grpSpPr>
-        <a:xfrm>
-          <a:off x="0" y="0"/>
-          <a:ext cx="0" cy="0"/>
-          <a:chOff x="0" y="0"/>
-          <a:chExt cx="0" cy="0"/>
-        </a:xfrm>
-      </p:grpSpPr>
-      <p:sp>
-        <p:nvSpPr>
-          <p:cNvPr id="2" name="Slide Image Placeholder 1"/>
-          <p:cNvSpPr>
-            <a:spLocks noGrp="1" noRot="1" noChangeAspect="1"/>
-          </p:cNvSpPr>
-          <p:nvPr>
-            <p:ph type="sldImg"/>
-          </p:nvPr>
-        </p:nvSpPr>
-        <p:spPr/>
-      </p:sp>
-      <p:sp>
-        <p:nvSpPr>
-          <p:cNvPr id="3" name="Notes Placeholder 2"/>
-          <p:cNvSpPr>
-            <a:spLocks noGrp="1"/>
-          </p:cNvSpPr>
-          <p:nvPr>
-            <p:ph type="body" idx="1"/>
-          </p:nvPr>
-        </p:nvSpPr>
-        <p:spPr/>
-        <p:txBody>
-          <a:bodyPr/>
-          <a:lstStyle/>
-          <a:p>
-            <a:r>
-              <a:rPr lang="en-CA" dirty="0" smtClean="0"/>
               <a:t>Untracked:</a:t>
             </a:r>
             <a:r>
@@ -803,7 +598,7 @@
 </p:notes>
 </file>
 
-<file path=ppt/notesSlides/notesSlide3.xml><?xml version="1.0" encoding="utf-8"?>
+<file path=ppt/notesSlides/notesSlide2.xml><?xml version="1.0" encoding="utf-8"?>
 <p:notes xmlns:a="http://schemas.openxmlformats.org/drawingml/2006/main" xmlns:r="http://schemas.openxmlformats.org/officeDocument/2006/relationships" xmlns:p="http://schemas.openxmlformats.org/presentationml/2006/main">
   <p:cSld>
     <p:spTree>
@@ -1075,7 +870,7 @@
           <a:p>
             <a:fld id="{0EC1CE10-7A36-4A3B-849C-60992C6CD584}" type="datetimeFigureOut">
               <a:rPr lang="en-CA" smtClean="0"/>
-              <a:t>2017-12-06</a:t>
+              <a:t>2017-12-04</a:t>
             </a:fld>
             <a:endParaRPr lang="en-CA"/>
           </a:p>
@@ -1245,7 +1040,7 @@
           <a:p>
             <a:fld id="{0EC1CE10-7A36-4A3B-849C-60992C6CD584}" type="datetimeFigureOut">
               <a:rPr lang="en-CA" smtClean="0"/>
-              <a:t>2017-12-06</a:t>
+              <a:t>2017-12-04</a:t>
             </a:fld>
             <a:endParaRPr lang="en-CA"/>
           </a:p>
@@ -1425,7 +1220,7 @@
           <a:p>
             <a:fld id="{0EC1CE10-7A36-4A3B-849C-60992C6CD584}" type="datetimeFigureOut">
               <a:rPr lang="en-CA" smtClean="0"/>
-              <a:t>2017-12-06</a:t>
+              <a:t>2017-12-04</a:t>
             </a:fld>
             <a:endParaRPr lang="en-CA"/>
           </a:p>
@@ -1595,7 +1390,7 @@
           <a:p>
             <a:fld id="{0EC1CE10-7A36-4A3B-849C-60992C6CD584}" type="datetimeFigureOut">
               <a:rPr lang="en-CA" smtClean="0"/>
-              <a:t>2017-12-06</a:t>
+              <a:t>2017-12-04</a:t>
             </a:fld>
             <a:endParaRPr lang="en-CA"/>
           </a:p>
@@ -1841,7 +1636,7 @@
           <a:p>
             <a:fld id="{0EC1CE10-7A36-4A3B-849C-60992C6CD584}" type="datetimeFigureOut">
               <a:rPr lang="en-CA" smtClean="0"/>
-              <a:t>2017-12-06</a:t>
+              <a:t>2017-12-04</a:t>
             </a:fld>
             <a:endParaRPr lang="en-CA"/>
           </a:p>
@@ -2073,7 +1868,7 @@
           <a:p>
             <a:fld id="{0EC1CE10-7A36-4A3B-849C-60992C6CD584}" type="datetimeFigureOut">
               <a:rPr lang="en-CA" smtClean="0"/>
-              <a:t>2017-12-06</a:t>
+              <a:t>2017-12-04</a:t>
             </a:fld>
             <a:endParaRPr lang="en-CA"/>
           </a:p>
@@ -2440,7 +2235,7 @@
           <a:p>
             <a:fld id="{0EC1CE10-7A36-4A3B-849C-60992C6CD584}" type="datetimeFigureOut">
               <a:rPr lang="en-CA" smtClean="0"/>
-              <a:t>2017-12-06</a:t>
+              <a:t>2017-12-04</a:t>
             </a:fld>
             <a:endParaRPr lang="en-CA"/>
           </a:p>
@@ -2558,7 +2353,7 @@
           <a:p>
             <a:fld id="{0EC1CE10-7A36-4A3B-849C-60992C6CD584}" type="datetimeFigureOut">
               <a:rPr lang="en-CA" smtClean="0"/>
-              <a:t>2017-12-06</a:t>
+              <a:t>2017-12-04</a:t>
             </a:fld>
             <a:endParaRPr lang="en-CA"/>
           </a:p>
@@ -2653,7 +2448,7 @@
           <a:p>
             <a:fld id="{0EC1CE10-7A36-4A3B-849C-60992C6CD584}" type="datetimeFigureOut">
               <a:rPr lang="en-CA" smtClean="0"/>
-              <a:t>2017-12-06</a:t>
+              <a:t>2017-12-04</a:t>
             </a:fld>
             <a:endParaRPr lang="en-CA"/>
           </a:p>
@@ -2930,7 +2725,7 @@
           <a:p>
             <a:fld id="{0EC1CE10-7A36-4A3B-849C-60992C6CD584}" type="datetimeFigureOut">
               <a:rPr lang="en-CA" smtClean="0"/>
-              <a:t>2017-12-06</a:t>
+              <a:t>2017-12-04</a:t>
             </a:fld>
             <a:endParaRPr lang="en-CA"/>
           </a:p>
@@ -3187,7 +2982,7 @@
           <a:p>
             <a:fld id="{0EC1CE10-7A36-4A3B-849C-60992C6CD584}" type="datetimeFigureOut">
               <a:rPr lang="en-CA" smtClean="0"/>
-              <a:t>2017-12-06</a:t>
+              <a:t>2017-12-04</a:t>
             </a:fld>
             <a:endParaRPr lang="en-CA"/>
           </a:p>
@@ -3400,7 +3195,7 @@
           <a:p>
             <a:fld id="{0EC1CE10-7A36-4A3B-849C-60992C6CD584}" type="datetimeFigureOut">
               <a:rPr lang="en-CA" smtClean="0"/>
-              <a:t>2017-12-06</a:t>
+              <a:t>2017-12-04</a:t>
             </a:fld>
             <a:endParaRPr lang="en-CA"/>
           </a:p>
@@ -3952,14 +3747,27 @@
           <a:p>
             <a:r>
               <a:rPr lang="en-CA" sz="3600" dirty="0" smtClean="0"/>
-              <a:t>Slightly more advanced (in the second half)</a:t>
-            </a:r>
+              <a:t>Slightly more advanced </a:t>
+            </a:r>
+            <a:r>
+              <a:rPr lang="en-CA" sz="3600" dirty="0" smtClean="0"/>
+              <a:t>(in the second half)</a:t>
+            </a:r>
+            <a:endParaRPr lang="en-CA" sz="3600" dirty="0" smtClean="0"/>
           </a:p>
           <a:p>
             <a:pPr lvl="1"/>
             <a:r>
               <a:rPr lang="en-CA" sz="3600" dirty="0" smtClean="0"/>
-              <a:t>Collaborating using local and remote repositories</a:t>
+              <a:t>Collaborating </a:t>
+            </a:r>
+            <a:r>
+              <a:rPr lang="en-CA" sz="3600" dirty="0" smtClean="0"/>
+              <a:t>using local and remote </a:t>
+            </a:r>
+            <a:r>
+              <a:rPr lang="en-CA" sz="3600" dirty="0" smtClean="0"/>
+              <a:t>repositories</a:t>
             </a:r>
           </a:p>
           <a:p>
@@ -3972,6 +3780,7 @@
               <a:rPr lang="en-CA" sz="3600" dirty="0" smtClean="0"/>
               <a:t>branches</a:t>
             </a:r>
+            <a:endParaRPr lang="en-CA" sz="3600" dirty="0" smtClean="0"/>
           </a:p>
           <a:p>
             <a:pPr lvl="1"/>
@@ -3979,6 +3788,7 @@
               <a:rPr lang="en-CA" sz="3600" dirty="0" smtClean="0"/>
               <a:t>Other useful tricks </a:t>
             </a:r>
+            <a:endParaRPr lang="en-CA" sz="3600" dirty="0" smtClean="0"/>
           </a:p>
         </p:txBody>
       </p:sp>
@@ -3995,270 +3805,7 @@
   <p:timing>
     <p:tnLst>
       <p:par>
-        <p:cTn id="1" dur="indefinite" restart="never" nodeType="tmRoot">
-          <p:childTnLst>
-            <p:seq concurrent="1" nextAc="seek">
-              <p:cTn id="2" dur="indefinite" nodeType="mainSeq">
-                <p:childTnLst>
-                  <p:par>
-                    <p:cTn id="3" fill="hold">
-                      <p:stCondLst>
-                        <p:cond delay="indefinite"/>
-                      </p:stCondLst>
-                      <p:childTnLst>
-                        <p:par>
-                          <p:cTn id="4" fill="hold">
-                            <p:stCondLst>
-                              <p:cond delay="0"/>
-                            </p:stCondLst>
-                            <p:childTnLst>
-                              <p:par>
-                                <p:cTn id="5" presetID="1" presetClass="entr" presetSubtype="0" fill="hold" nodeType="clickEffect">
-                                  <p:stCondLst>
-                                    <p:cond delay="0"/>
-                                  </p:stCondLst>
-                                  <p:childTnLst>
-                                    <p:set>
-                                      <p:cBhvr>
-                                        <p:cTn id="6" dur="1" fill="hold">
-                                          <p:stCondLst>
-                                            <p:cond delay="0"/>
-                                          </p:stCondLst>
-                                        </p:cTn>
-                                        <p:tgtEl>
-                                          <p:spTgt spid="3">
-                                            <p:txEl>
-                                              <p:pRg st="0" end="0"/>
-                                            </p:txEl>
-                                          </p:spTgt>
-                                        </p:tgtEl>
-                                        <p:attrNameLst>
-                                          <p:attrName>style.visibility</p:attrName>
-                                        </p:attrNameLst>
-                                      </p:cBhvr>
-                                      <p:to>
-                                        <p:strVal val="visible"/>
-                                      </p:to>
-                                    </p:set>
-                                  </p:childTnLst>
-                                </p:cTn>
-                              </p:par>
-                            </p:childTnLst>
-                          </p:cTn>
-                        </p:par>
-                      </p:childTnLst>
-                    </p:cTn>
-                  </p:par>
-                  <p:par>
-                    <p:cTn id="7" fill="hold">
-                      <p:stCondLst>
-                        <p:cond delay="indefinite"/>
-                      </p:stCondLst>
-                      <p:childTnLst>
-                        <p:par>
-                          <p:cTn id="8" fill="hold">
-                            <p:stCondLst>
-                              <p:cond delay="0"/>
-                            </p:stCondLst>
-                            <p:childTnLst>
-                              <p:par>
-                                <p:cTn id="9" presetID="1" presetClass="entr" presetSubtype="0" fill="hold" nodeType="clickEffect">
-                                  <p:stCondLst>
-                                    <p:cond delay="0"/>
-                                  </p:stCondLst>
-                                  <p:childTnLst>
-                                    <p:set>
-                                      <p:cBhvr>
-                                        <p:cTn id="10" dur="1" fill="hold">
-                                          <p:stCondLst>
-                                            <p:cond delay="0"/>
-                                          </p:stCondLst>
-                                        </p:cTn>
-                                        <p:tgtEl>
-                                          <p:spTgt spid="3">
-                                            <p:txEl>
-                                              <p:pRg st="1" end="1"/>
-                                            </p:txEl>
-                                          </p:spTgt>
-                                        </p:tgtEl>
-                                        <p:attrNameLst>
-                                          <p:attrName>style.visibility</p:attrName>
-                                        </p:attrNameLst>
-                                      </p:cBhvr>
-                                      <p:to>
-                                        <p:strVal val="visible"/>
-                                      </p:to>
-                                    </p:set>
-                                  </p:childTnLst>
-                                </p:cTn>
-                              </p:par>
-                            </p:childTnLst>
-                          </p:cTn>
-                        </p:par>
-                      </p:childTnLst>
-                    </p:cTn>
-                  </p:par>
-                  <p:par>
-                    <p:cTn id="11" fill="hold">
-                      <p:stCondLst>
-                        <p:cond delay="indefinite"/>
-                      </p:stCondLst>
-                      <p:childTnLst>
-                        <p:par>
-                          <p:cTn id="12" fill="hold">
-                            <p:stCondLst>
-                              <p:cond delay="0"/>
-                            </p:stCondLst>
-                            <p:childTnLst>
-                              <p:par>
-                                <p:cTn id="13" presetID="1" presetClass="entr" presetSubtype="0" fill="hold" nodeType="clickEffect">
-                                  <p:stCondLst>
-                                    <p:cond delay="0"/>
-                                  </p:stCondLst>
-                                  <p:childTnLst>
-                                    <p:set>
-                                      <p:cBhvr>
-                                        <p:cTn id="14" dur="1" fill="hold">
-                                          <p:stCondLst>
-                                            <p:cond delay="0"/>
-                                          </p:stCondLst>
-                                        </p:cTn>
-                                        <p:tgtEl>
-                                          <p:spTgt spid="3">
-                                            <p:txEl>
-                                              <p:pRg st="2" end="2"/>
-                                            </p:txEl>
-                                          </p:spTgt>
-                                        </p:tgtEl>
-                                        <p:attrNameLst>
-                                          <p:attrName>style.visibility</p:attrName>
-                                        </p:attrNameLst>
-                                      </p:cBhvr>
-                                      <p:to>
-                                        <p:strVal val="visible"/>
-                                      </p:to>
-                                    </p:set>
-                                  </p:childTnLst>
-                                </p:cTn>
-                              </p:par>
-                              <p:par>
-                                <p:cTn id="15" presetID="1" presetClass="entr" presetSubtype="0" fill="hold" nodeType="withEffect">
-                                  <p:stCondLst>
-                                    <p:cond delay="0"/>
-                                  </p:stCondLst>
-                                  <p:childTnLst>
-                                    <p:set>
-                                      <p:cBhvr>
-                                        <p:cTn id="16" dur="1" fill="hold">
-                                          <p:stCondLst>
-                                            <p:cond delay="0"/>
-                                          </p:stCondLst>
-                                        </p:cTn>
-                                        <p:tgtEl>
-                                          <p:spTgt spid="3">
-                                            <p:txEl>
-                                              <p:pRg st="3" end="3"/>
-                                            </p:txEl>
-                                          </p:spTgt>
-                                        </p:tgtEl>
-                                        <p:attrNameLst>
-                                          <p:attrName>style.visibility</p:attrName>
-                                        </p:attrNameLst>
-                                      </p:cBhvr>
-                                      <p:to>
-                                        <p:strVal val="visible"/>
-                                      </p:to>
-                                    </p:set>
-                                  </p:childTnLst>
-                                </p:cTn>
-                              </p:par>
-                              <p:par>
-                                <p:cTn id="17" presetID="1" presetClass="entr" presetSubtype="0" fill="hold" nodeType="withEffect">
-                                  <p:stCondLst>
-                                    <p:cond delay="0"/>
-                                  </p:stCondLst>
-                                  <p:childTnLst>
-                                    <p:set>
-                                      <p:cBhvr>
-                                        <p:cTn id="18" dur="1" fill="hold">
-                                          <p:stCondLst>
-                                            <p:cond delay="0"/>
-                                          </p:stCondLst>
-                                        </p:cTn>
-                                        <p:tgtEl>
-                                          <p:spTgt spid="3">
-                                            <p:txEl>
-                                              <p:pRg st="4" end="4"/>
-                                            </p:txEl>
-                                          </p:spTgt>
-                                        </p:tgtEl>
-                                        <p:attrNameLst>
-                                          <p:attrName>style.visibility</p:attrName>
-                                        </p:attrNameLst>
-                                      </p:cBhvr>
-                                      <p:to>
-                                        <p:strVal val="visible"/>
-                                      </p:to>
-                                    </p:set>
-                                  </p:childTnLst>
-                                </p:cTn>
-                              </p:par>
-                              <p:par>
-                                <p:cTn id="19" presetID="1" presetClass="entr" presetSubtype="0" fill="hold" nodeType="withEffect">
-                                  <p:stCondLst>
-                                    <p:cond delay="0"/>
-                                  </p:stCondLst>
-                                  <p:childTnLst>
-                                    <p:set>
-                                      <p:cBhvr>
-                                        <p:cTn id="20" dur="1" fill="hold">
-                                          <p:stCondLst>
-                                            <p:cond delay="0"/>
-                                          </p:stCondLst>
-                                        </p:cTn>
-                                        <p:tgtEl>
-                                          <p:spTgt spid="3">
-                                            <p:txEl>
-                                              <p:pRg st="5" end="5"/>
-                                            </p:txEl>
-                                          </p:spTgt>
-                                        </p:tgtEl>
-                                        <p:attrNameLst>
-                                          <p:attrName>style.visibility</p:attrName>
-                                        </p:attrNameLst>
-                                      </p:cBhvr>
-                                      <p:to>
-                                        <p:strVal val="visible"/>
-                                      </p:to>
-                                    </p:set>
-                                  </p:childTnLst>
-                                </p:cTn>
-                              </p:par>
-                            </p:childTnLst>
-                          </p:cTn>
-                        </p:par>
-                      </p:childTnLst>
-                    </p:cTn>
-                  </p:par>
-                </p:childTnLst>
-              </p:cTn>
-              <p:prevCondLst>
-                <p:cond evt="onPrev" delay="0">
-                  <p:tgtEl>
-                    <p:sldTgt/>
-                  </p:tgtEl>
-                </p:cond>
-              </p:prevCondLst>
-              <p:nextCondLst>
-                <p:cond evt="onNext" delay="0">
-                  <p:tgtEl>
-                    <p:sldTgt/>
-                  </p:tgtEl>
-                </p:cond>
-              </p:nextCondLst>
-            </p:seq>
-          </p:childTnLst>
-        </p:cTn>
+        <p:cTn id="1" dur="indefinite" restart="never" nodeType="tmRoot"/>
       </p:par>
     </p:tnLst>
   </p:timing>
@@ -4327,15 +3874,7 @@
             </a:pPr>
             <a:r>
               <a:rPr lang="en-CA" dirty="0" smtClean="0"/>
-              <a:t>Open up </a:t>
-            </a:r>
-            <a:r>
-              <a:rPr lang="en-CA" dirty="0" smtClean="0"/>
-              <a:t>a command line terminal (git bash on Windows, terminal on Mac) and </a:t>
-            </a:r>
-            <a:r>
-              <a:rPr lang="en-CA" dirty="0" smtClean="0"/>
-              <a:t>type in the following two lines (using your own name and email):</a:t>
+              <a:t>Open up a command terminal and type in the following two lines (using your own name and email):</a:t>
             </a:r>
           </a:p>
           <a:p>
@@ -9080,7 +8619,7 @@
             </a:r>
             <a:r>
               <a:rPr lang="en-CA" dirty="0" smtClean="0"/>
-              <a:t>(15 minutes)</a:t>
+              <a:t>(10 minutes)</a:t>
             </a:r>
             <a:endParaRPr lang="en-CA" dirty="0"/>
           </a:p>
@@ -13287,223 +12826,6 @@
 </file>
 
 <file path=ppt/slides/slide29.xml><?xml version="1.0" encoding="utf-8"?>
-<p:sld xmlns:a="http://schemas.openxmlformats.org/drawingml/2006/main" xmlns:r="http://schemas.openxmlformats.org/officeDocument/2006/relationships" xmlns:p="http://schemas.openxmlformats.org/presentationml/2006/main">
-  <p:cSld>
-    <p:spTree>
-      <p:nvGrpSpPr>
-        <p:cNvPr id="1" name=""/>
-        <p:cNvGrpSpPr/>
-        <p:nvPr/>
-      </p:nvGrpSpPr>
-      <p:grpSpPr>
-        <a:xfrm>
-          <a:off x="0" y="0"/>
-          <a:ext cx="0" cy="0"/>
-          <a:chOff x="0" y="0"/>
-          <a:chExt cx="0" cy="0"/>
-        </a:xfrm>
-      </p:grpSpPr>
-      <p:sp>
-        <p:nvSpPr>
-          <p:cNvPr id="2" name="Title 1"/>
-          <p:cNvSpPr>
-            <a:spLocks noGrp="1"/>
-          </p:cNvSpPr>
-          <p:nvPr>
-            <p:ph type="title"/>
-          </p:nvPr>
-        </p:nvSpPr>
-        <p:spPr>
-          <a:xfrm>
-            <a:off x="1159329" y="1811791"/>
-            <a:ext cx="9873342" cy="3234418"/>
-          </a:xfrm>
-        </p:spPr>
-        <p:txBody>
-          <a:bodyPr>
-            <a:noAutofit/>
-          </a:bodyPr>
-          <a:lstStyle/>
-          <a:p>
-            <a:r>
-              <a:rPr lang="en-CA" sz="5400" dirty="0" smtClean="0"/>
-              <a:t>A quick demo of working with a remote repository</a:t>
-            </a:r>
-            <a:endParaRPr lang="en-CA" sz="5400" dirty="0"/>
-          </a:p>
-        </p:txBody>
-      </p:sp>
-    </p:spTree>
-    <p:extLst>
-      <p:ext uri="{BB962C8B-B14F-4D97-AF65-F5344CB8AC3E}">
-        <p14:creationId xmlns:p14="http://schemas.microsoft.com/office/powerpoint/2010/main" val="2473864016"/>
-      </p:ext>
-    </p:extLst>
-  </p:cSld>
-  <p:clrMapOvr>
-    <a:masterClrMapping/>
-  </p:clrMapOvr>
-  <p:timing>
-    <p:tnLst>
-      <p:par>
-        <p:cTn id="1" dur="indefinite" restart="never" nodeType="tmRoot"/>
-      </p:par>
-    </p:tnLst>
-  </p:timing>
-</p:sld>
-</file>
-
-<file path=ppt/slides/slide3.xml><?xml version="1.0" encoding="utf-8"?>
-<p:sld xmlns:a="http://schemas.openxmlformats.org/drawingml/2006/main" xmlns:r="http://schemas.openxmlformats.org/officeDocument/2006/relationships" xmlns:p="http://schemas.openxmlformats.org/presentationml/2006/main">
-  <p:cSld>
-    <p:spTree>
-      <p:nvGrpSpPr>
-        <p:cNvPr id="1" name=""/>
-        <p:cNvGrpSpPr/>
-        <p:nvPr/>
-      </p:nvGrpSpPr>
-      <p:grpSpPr>
-        <a:xfrm>
-          <a:off x="0" y="0"/>
-          <a:ext cx="0" cy="0"/>
-          <a:chOff x="0" y="0"/>
-          <a:chExt cx="0" cy="0"/>
-        </a:xfrm>
-      </p:grpSpPr>
-      <p:sp>
-        <p:nvSpPr>
-          <p:cNvPr id="2" name="Title 1"/>
-          <p:cNvSpPr>
-            <a:spLocks noGrp="1"/>
-          </p:cNvSpPr>
-          <p:nvPr>
-            <p:ph type="title"/>
-          </p:nvPr>
-        </p:nvSpPr>
-        <p:spPr/>
-        <p:txBody>
-          <a:bodyPr/>
-          <a:lstStyle/>
-          <a:p>
-            <a:r>
-              <a:rPr lang="en-CA" dirty="0" smtClean="0"/>
-              <a:t>The lab book has many purposes:</a:t>
-            </a:r>
-            <a:endParaRPr lang="en-CA" dirty="0"/>
-          </a:p>
-        </p:txBody>
-      </p:sp>
-      <p:sp>
-        <p:nvSpPr>
-          <p:cNvPr id="3" name="Content Placeholder 2"/>
-          <p:cNvSpPr>
-            <a:spLocks noGrp="1"/>
-          </p:cNvSpPr>
-          <p:nvPr>
-            <p:ph idx="1"/>
-          </p:nvPr>
-        </p:nvSpPr>
-        <p:spPr>
-          <a:xfrm>
-            <a:off x="7045817" y="1447242"/>
-            <a:ext cx="5146183" cy="5108104"/>
-          </a:xfrm>
-        </p:spPr>
-        <p:txBody>
-          <a:bodyPr>
-            <a:normAutofit fontScale="92500"/>
-          </a:bodyPr>
-          <a:lstStyle/>
-          <a:p>
-            <a:r>
-              <a:rPr lang="en-CA" dirty="0" smtClean="0"/>
-              <a:t>Reminds you of what you’ve done</a:t>
-            </a:r>
-          </a:p>
-          <a:p>
-            <a:r>
-              <a:rPr lang="en-CA" dirty="0" smtClean="0"/>
-              <a:t>Lets you go back to change something that went wrong</a:t>
-            </a:r>
-          </a:p>
-          <a:p>
-            <a:r>
-              <a:rPr lang="en-CA" dirty="0" smtClean="0"/>
-              <a:t>Lets other people reproduce your work or pick up where you left off</a:t>
-            </a:r>
-          </a:p>
-          <a:p>
-            <a:r>
-              <a:rPr lang="en-CA" dirty="0" smtClean="0"/>
-              <a:t>Serves as proof that the work was done</a:t>
-            </a:r>
-          </a:p>
-          <a:p>
-            <a:endParaRPr lang="en-CA" dirty="0"/>
-          </a:p>
-          <a:p>
-            <a:pPr marL="0" indent="0">
-              <a:buNone/>
-            </a:pPr>
-            <a:r>
-              <a:rPr lang="en-CA" sz="3200" b="1" dirty="0" smtClean="0"/>
-              <a:t>Why do many people stop when it comes to writing code?</a:t>
-            </a:r>
-            <a:endParaRPr lang="en-CA" sz="3200" b="1" dirty="0"/>
-          </a:p>
-        </p:txBody>
-      </p:sp>
-      <p:pic>
-        <p:nvPicPr>
-          <p:cNvPr id="4" name="Picture 3"/>
-          <p:cNvPicPr>
-            <a:picLocks noChangeAspect="1"/>
-          </p:cNvPicPr>
-          <p:nvPr/>
-        </p:nvPicPr>
-        <p:blipFill>
-          <a:blip r:embed="rId2">
-            <a:extLst>
-              <a:ext uri="{28A0092B-C50C-407E-A947-70E740481C1C}">
-                <a14:useLocalDpi xmlns:a14="http://schemas.microsoft.com/office/drawing/2010/main" val="0"/>
-              </a:ext>
-            </a:extLst>
-          </a:blip>
-          <a:stretch>
-            <a:fillRect/>
-          </a:stretch>
-        </p:blipFill>
-        <p:spPr>
-          <a:xfrm>
-            <a:off x="10305" y="1447242"/>
-            <a:ext cx="6815412" cy="5108104"/>
-          </a:xfrm>
-          <a:prstGeom prst="rect">
-            <a:avLst/>
-          </a:prstGeom>
-        </p:spPr>
-      </p:pic>
-    </p:spTree>
-    <p:extLst>
-      <p:ext uri="{BB962C8B-B14F-4D97-AF65-F5344CB8AC3E}">
-        <p14:creationId xmlns:p14="http://schemas.microsoft.com/office/powerpoint/2010/main" val="2669413875"/>
-      </p:ext>
-    </p:extLst>
-  </p:cSld>
-  <p:clrMapOvr>
-    <a:masterClrMapping/>
-  </p:clrMapOvr>
-  <p:timing>
-    <p:tnLst>
-      <p:par>
-        <p:cTn id="1" dur="indefinite" restart="never" nodeType="tmRoot"/>
-      </p:par>
-    </p:tnLst>
-  </p:timing>
-</p:sld>
-</file>
-
-<file path=ppt/slides/slide30.xml><?xml version="1.0" encoding="utf-8"?>
 <p:sld xmlns:a="http://schemas.openxmlformats.org/drawingml/2006/main" xmlns:r="http://schemas.openxmlformats.org/officeDocument/2006/relationships" xmlns:p="http://schemas.openxmlformats.org/presentationml/2006/main">
   <p:cSld>
     <p:spTree>
@@ -14919,7 +14241,157 @@
 </p:sld>
 </file>
 
-<file path=ppt/slides/slide31.xml><?xml version="1.0" encoding="utf-8"?>
+<file path=ppt/slides/slide3.xml><?xml version="1.0" encoding="utf-8"?>
+<p:sld xmlns:a="http://schemas.openxmlformats.org/drawingml/2006/main" xmlns:r="http://schemas.openxmlformats.org/officeDocument/2006/relationships" xmlns:p="http://schemas.openxmlformats.org/presentationml/2006/main">
+  <p:cSld>
+    <p:spTree>
+      <p:nvGrpSpPr>
+        <p:cNvPr id="1" name=""/>
+        <p:cNvGrpSpPr/>
+        <p:nvPr/>
+      </p:nvGrpSpPr>
+      <p:grpSpPr>
+        <a:xfrm>
+          <a:off x="0" y="0"/>
+          <a:ext cx="0" cy="0"/>
+          <a:chOff x="0" y="0"/>
+          <a:chExt cx="0" cy="0"/>
+        </a:xfrm>
+      </p:grpSpPr>
+      <p:sp>
+        <p:nvSpPr>
+          <p:cNvPr id="2" name="Title 1"/>
+          <p:cNvSpPr>
+            <a:spLocks noGrp="1"/>
+          </p:cNvSpPr>
+          <p:nvPr>
+            <p:ph type="title"/>
+          </p:nvPr>
+        </p:nvSpPr>
+        <p:spPr/>
+        <p:txBody>
+          <a:bodyPr/>
+          <a:lstStyle/>
+          <a:p>
+            <a:r>
+              <a:rPr lang="en-CA" dirty="0" smtClean="0"/>
+              <a:t>The lab book has many purposes:</a:t>
+            </a:r>
+            <a:endParaRPr lang="en-CA" dirty="0"/>
+          </a:p>
+        </p:txBody>
+      </p:sp>
+      <p:sp>
+        <p:nvSpPr>
+          <p:cNvPr id="3" name="Content Placeholder 2"/>
+          <p:cNvSpPr>
+            <a:spLocks noGrp="1"/>
+          </p:cNvSpPr>
+          <p:nvPr>
+            <p:ph idx="1"/>
+          </p:nvPr>
+        </p:nvSpPr>
+        <p:spPr>
+          <a:xfrm>
+            <a:off x="7045817" y="1447242"/>
+            <a:ext cx="5146183" cy="5108104"/>
+          </a:xfrm>
+        </p:spPr>
+        <p:txBody>
+          <a:bodyPr>
+            <a:normAutofit fontScale="92500"/>
+          </a:bodyPr>
+          <a:lstStyle/>
+          <a:p>
+            <a:r>
+              <a:rPr lang="en-CA" dirty="0" smtClean="0"/>
+              <a:t>Reminds you of what you’ve done</a:t>
+            </a:r>
+          </a:p>
+          <a:p>
+            <a:r>
+              <a:rPr lang="en-CA" dirty="0" smtClean="0"/>
+              <a:t>Lets you go back to change something that went wrong</a:t>
+            </a:r>
+          </a:p>
+          <a:p>
+            <a:r>
+              <a:rPr lang="en-CA" dirty="0" smtClean="0"/>
+              <a:t>Lets other people reproduce your work or pick up where you left off</a:t>
+            </a:r>
+          </a:p>
+          <a:p>
+            <a:r>
+              <a:rPr lang="en-CA" dirty="0" smtClean="0"/>
+              <a:t>Serves as proof that the work was done</a:t>
+            </a:r>
+          </a:p>
+          <a:p>
+            <a:endParaRPr lang="en-CA" dirty="0"/>
+          </a:p>
+          <a:p>
+            <a:pPr marL="0" indent="0">
+              <a:buNone/>
+            </a:pPr>
+            <a:r>
+              <a:rPr lang="en-CA" sz="3200" b="1" dirty="0" smtClean="0"/>
+              <a:t>Why do many people stop when it comes to writing code?</a:t>
+            </a:r>
+            <a:endParaRPr lang="en-CA" sz="3200" b="1" dirty="0"/>
+          </a:p>
+        </p:txBody>
+      </p:sp>
+      <p:pic>
+        <p:nvPicPr>
+          <p:cNvPr id="4" name="Picture 3"/>
+          <p:cNvPicPr>
+            <a:picLocks noChangeAspect="1"/>
+          </p:cNvPicPr>
+          <p:nvPr/>
+        </p:nvPicPr>
+        <p:blipFill>
+          <a:blip r:embed="rId2">
+            <a:extLst>
+              <a:ext uri="{28A0092B-C50C-407E-A947-70E740481C1C}">
+                <a14:useLocalDpi xmlns:a14="http://schemas.microsoft.com/office/drawing/2010/main" val="0"/>
+              </a:ext>
+            </a:extLst>
+          </a:blip>
+          <a:stretch>
+            <a:fillRect/>
+          </a:stretch>
+        </p:blipFill>
+        <p:spPr>
+          <a:xfrm>
+            <a:off x="10305" y="1447242"/>
+            <a:ext cx="6815412" cy="5108104"/>
+          </a:xfrm>
+          <a:prstGeom prst="rect">
+            <a:avLst/>
+          </a:prstGeom>
+        </p:spPr>
+      </p:pic>
+    </p:spTree>
+    <p:extLst>
+      <p:ext uri="{BB962C8B-B14F-4D97-AF65-F5344CB8AC3E}">
+        <p14:creationId xmlns:p14="http://schemas.microsoft.com/office/powerpoint/2010/main" val="2669413875"/>
+      </p:ext>
+    </p:extLst>
+  </p:cSld>
+  <p:clrMapOvr>
+    <a:masterClrMapping/>
+  </p:clrMapOvr>
+  <p:timing>
+    <p:tnLst>
+      <p:par>
+        <p:cTn id="1" dur="indefinite" restart="never" nodeType="tmRoot"/>
+      </p:par>
+    </p:tnLst>
+  </p:timing>
+</p:sld>
+</file>
+
+<file path=ppt/slides/slide30.xml><?xml version="1.0" encoding="utf-8"?>
 <p:sld xmlns:a="http://schemas.openxmlformats.org/drawingml/2006/main" xmlns:r="http://schemas.openxmlformats.org/officeDocument/2006/relationships" xmlns:p="http://schemas.openxmlformats.org/presentationml/2006/main">
   <p:cSld>
     <p:spTree>
@@ -15008,7 +14480,7 @@
 </p:sld>
 </file>
 
-<file path=ppt/slides/slide32.xml><?xml version="1.0" encoding="utf-8"?>
+<file path=ppt/slides/slide31.xml><?xml version="1.0" encoding="utf-8"?>
 <p:sld xmlns:a="http://schemas.openxmlformats.org/drawingml/2006/main" xmlns:r="http://schemas.openxmlformats.org/officeDocument/2006/relationships" xmlns:p="http://schemas.openxmlformats.org/presentationml/2006/main">
   <p:cSld>
     <p:spTree>
@@ -15098,7 +14570,7 @@
 </p:sld>
 </file>
 
-<file path=ppt/slides/slide33.xml><?xml version="1.0" encoding="utf-8"?>
+<file path=ppt/slides/slide32.xml><?xml version="1.0" encoding="utf-8"?>
 <p:sld xmlns:a="http://schemas.openxmlformats.org/drawingml/2006/main" xmlns:r="http://schemas.openxmlformats.org/officeDocument/2006/relationships" xmlns:p="http://schemas.openxmlformats.org/presentationml/2006/main">
   <p:cSld>
     <p:spTree>
@@ -15238,7 +14710,7 @@
 </p:sld>
 </file>
 
-<file path=ppt/slides/slide34.xml><?xml version="1.0" encoding="utf-8"?>
+<file path=ppt/slides/slide33.xml><?xml version="1.0" encoding="utf-8"?>
 <p:sld xmlns:a="http://schemas.openxmlformats.org/drawingml/2006/main" xmlns:r="http://schemas.openxmlformats.org/officeDocument/2006/relationships" xmlns:p="http://schemas.openxmlformats.org/presentationml/2006/main">
   <p:cSld>
     <p:spTree>
@@ -15405,7 +14877,7 @@
 </p:sld>
 </file>
 
-<file path=ppt/slides/slide35.xml><?xml version="1.0" encoding="utf-8"?>
+<file path=ppt/slides/slide34.xml><?xml version="1.0" encoding="utf-8"?>
 <p:sld xmlns:a="http://schemas.openxmlformats.org/drawingml/2006/main" xmlns:r="http://schemas.openxmlformats.org/officeDocument/2006/relationships" xmlns:p="http://schemas.openxmlformats.org/presentationml/2006/main">
   <p:cSld>
     <p:spTree>
@@ -15546,7 +15018,7 @@
 </p:sld>
 </file>
 
-<file path=ppt/slides/slide36.xml><?xml version="1.0" encoding="utf-8"?>
+<file path=ppt/slides/slide35.xml><?xml version="1.0" encoding="utf-8"?>
 <p:sld xmlns:a="http://schemas.openxmlformats.org/drawingml/2006/main" xmlns:r="http://schemas.openxmlformats.org/officeDocument/2006/relationships" xmlns:p="http://schemas.openxmlformats.org/presentationml/2006/main">
   <p:cSld>
     <p:spTree>
@@ -15831,7 +15303,7 @@
 </p:sld>
 </file>
 
-<file path=ppt/slides/slide37.xml><?xml version="1.0" encoding="utf-8"?>
+<file path=ppt/slides/slide36.xml><?xml version="1.0" encoding="utf-8"?>
 <p:sld xmlns:a="http://schemas.openxmlformats.org/drawingml/2006/main" xmlns:r="http://schemas.openxmlformats.org/officeDocument/2006/relationships" xmlns:p="http://schemas.openxmlformats.org/presentationml/2006/main">
   <p:cSld>
     <p:spTree>
@@ -17158,8 +16630,13 @@
           <a:p>
             <a:r>
               <a:rPr lang="en-CA" sz="3600" dirty="0" smtClean="0"/>
-              <a:t>Can put things on GitHub (more about this in the second half)</a:t>
-            </a:r>
+              <a:t>Can put things on GitHub (more about this </a:t>
+            </a:r>
+            <a:r>
+              <a:rPr lang="en-CA" sz="3600" dirty="0" smtClean="0"/>
+              <a:t>in the second half)</a:t>
+            </a:r>
+            <a:endParaRPr lang="en-CA" sz="3600" dirty="0" smtClean="0"/>
           </a:p>
         </p:txBody>
       </p:sp>
@@ -17862,7 +17339,7 @@
   <a:extraClrSchemeLst/>
   <a:extLst>
     <a:ext uri="{05A4C25C-085E-4340-85A3-A5531E510DB2}">
-      <thm15:themeFamily xmlns:thm15="http://schemas.microsoft.com/office/thememl/2012/main" xmlns="" name="Office Theme" id="{62F939B6-93AF-4DB8-9C6B-D6C7DFDC589F}" vid="{4F46216B-77A9-411A-B9D3-5023FCB70208}"/>
+      <thm15:themeFamily xmlns="" xmlns:thm15="http://schemas.microsoft.com/office/thememl/2012/main" name="Office Theme" id="{62F939B6-93AF-4DB8-9C6B-D6C7DFDC589F}" vid="{4F46216B-77A9-411A-B9D3-5023FCB70208}"/>
     </a:ext>
   </a:extLst>
 </a:theme>

</xml_diff>